<commit_message>
Upload new material version
</commit_message>
<xml_diff>
--- a/Java SE 8 Teaching Material/Chapter 3 - Java Basic.pptx
+++ b/Java SE 8 Teaching Material/Chapter 3 - Java Basic.pptx
@@ -11,8 +11,9 @@
     <p:sldId id="260" r:id="rId5"/>
     <p:sldId id="261" r:id="rId6"/>
     <p:sldId id="262" r:id="rId7"/>
-    <p:sldId id="263" r:id="rId8"/>
-    <p:sldId id="264" r:id="rId9"/>
+    <p:sldId id="264" r:id="rId8"/>
+    <p:sldId id="265" r:id="rId9"/>
+    <p:sldId id="266" r:id="rId10"/>
   </p:sldIdLst>
   <p:sldSz cx="12192000" cy="6858000"/>
   <p:notesSz cx="6858000" cy="9144000"/>
@@ -122,8 +123,9 @@
             <p14:sldId id="260"/>
             <p14:sldId id="261"/>
             <p14:sldId id="262"/>
-            <p14:sldId id="263"/>
             <p14:sldId id="264"/>
+            <p14:sldId id="265"/>
+            <p14:sldId id="266"/>
           </p14:sldIdLst>
         </p14:section>
       </p14:sectionLst>
@@ -138,8 +140,7 @@
 <file path=ppt/revisionInfo.xml><?xml version="1.0" encoding="utf-8"?>
 <p1510:revInfo xmlns:a="http://schemas.openxmlformats.org/drawingml/2006/main" xmlns:r="http://schemas.openxmlformats.org/officeDocument/2006/relationships" xmlns:p1510="http://schemas.microsoft.com/office/powerpoint/2015/10/main">
   <p1510:revLst>
-    <p1510:client id="{92C8C979-F545-4FFE-B472-387B21A78BD7}" v="2678" dt="2024-07-12T04:08:30.122"/>
-    <p1510:client id="{9AF12651-E492-4749-A948-8FB040B70964}" v="10997" dt="2024-07-11T23:31:06.509"/>
+    <p1510:client id="{92C8C979-F545-4FFE-B472-387B21A78BD7}" v="4944" dt="2024-07-13T02:06:30.053"/>
   </p1510:revLst>
 </p1510:revInfo>
 </file>
@@ -149,7 +150,7 @@
   <pc:docChgLst>
     <pc:chgData name="Dinh Vinh Mai" userId="b8e4a559-41e0-4141-8dc1-330451d69615" providerId="ADAL" clId="{92C8C979-F545-4FFE-B472-387B21A78BD7}"/>
     <pc:docChg chg="undo custSel addSld delSld modSld modSection">
-      <pc:chgData name="Dinh Vinh Mai" userId="b8e4a559-41e0-4141-8dc1-330451d69615" providerId="ADAL" clId="{92C8C979-F545-4FFE-B472-387B21A78BD7}" dt="2024-07-12T04:31:40.463" v="9627" actId="115"/>
+      <pc:chgData name="Dinh Vinh Mai" userId="b8e4a559-41e0-4141-8dc1-330451d69615" providerId="ADAL" clId="{92C8C979-F545-4FFE-B472-387B21A78BD7}" dt="2024-07-13T02:06:30.052" v="12031" actId="20577"/>
       <pc:docMkLst>
         <pc:docMk/>
       </pc:docMkLst>
@@ -200,7 +201,7 @@
         </pc:graphicFrameChg>
       </pc:sldChg>
       <pc:sldChg chg="modSp add mod modAnim">
-        <pc:chgData name="Dinh Vinh Mai" userId="b8e4a559-41e0-4141-8dc1-330451d69615" providerId="ADAL" clId="{92C8C979-F545-4FFE-B472-387B21A78BD7}" dt="2024-07-12T00:14:07.922" v="2768" actId="207"/>
+        <pc:chgData name="Dinh Vinh Mai" userId="b8e4a559-41e0-4141-8dc1-330451d69615" providerId="ADAL" clId="{92C8C979-F545-4FFE-B472-387B21A78BD7}" dt="2024-07-12T10:32:17.212" v="9636"/>
         <pc:sldMkLst>
           <pc:docMk/>
           <pc:sldMk cId="69879196" sldId="259"/>
@@ -236,8 +237,8 @@
           <pc:sldMk cId="114777668" sldId="260"/>
         </pc:sldMkLst>
       </pc:sldChg>
-      <pc:sldChg chg="modSp add mod">
-        <pc:chgData name="Dinh Vinh Mai" userId="b8e4a559-41e0-4141-8dc1-330451d69615" providerId="ADAL" clId="{92C8C979-F545-4FFE-B472-387B21A78BD7}" dt="2024-07-12T01:50:32.544" v="3768" actId="5793"/>
+      <pc:sldChg chg="modSp add mod modAnim">
+        <pc:chgData name="Dinh Vinh Mai" userId="b8e4a559-41e0-4141-8dc1-330451d69615" providerId="ADAL" clId="{92C8C979-F545-4FFE-B472-387B21A78BD7}" dt="2024-07-12T10:32:21.737" v="9637"/>
         <pc:sldMkLst>
           <pc:docMk/>
           <pc:sldMk cId="3546735497" sldId="260"/>
@@ -266,8 +267,8 @@
           <pc:sldMk cId="646613574" sldId="261"/>
         </pc:sldMkLst>
       </pc:sldChg>
-      <pc:sldChg chg="addSp delSp modSp add mod">
-        <pc:chgData name="Dinh Vinh Mai" userId="b8e4a559-41e0-4141-8dc1-330451d69615" providerId="ADAL" clId="{92C8C979-F545-4FFE-B472-387B21A78BD7}" dt="2024-07-12T03:17:50.089" v="6525" actId="20577"/>
+      <pc:sldChg chg="addSp delSp modSp add mod modAnim">
+        <pc:chgData name="Dinh Vinh Mai" userId="b8e4a559-41e0-4141-8dc1-330451d69615" providerId="ADAL" clId="{92C8C979-F545-4FFE-B472-387B21A78BD7}" dt="2024-07-12T10:32:42.784" v="9642"/>
         <pc:sldMkLst>
           <pc:docMk/>
           <pc:sldMk cId="3523870962" sldId="261"/>
@@ -313,8 +314,8 @@
           </ac:spMkLst>
         </pc:spChg>
       </pc:sldChg>
-      <pc:sldChg chg="addSp modSp add mod">
-        <pc:chgData name="Dinh Vinh Mai" userId="b8e4a559-41e0-4141-8dc1-330451d69615" providerId="ADAL" clId="{92C8C979-F545-4FFE-B472-387B21A78BD7}" dt="2024-07-12T04:10:53.054" v="7616" actId="20577"/>
+      <pc:sldChg chg="addSp modSp add mod modAnim">
+        <pc:chgData name="Dinh Vinh Mai" userId="b8e4a559-41e0-4141-8dc1-330451d69615" providerId="ADAL" clId="{92C8C979-F545-4FFE-B472-387B21A78BD7}" dt="2024-07-12T10:33:01.557" v="9646"/>
         <pc:sldMkLst>
           <pc:docMk/>
           <pc:sldMk cId="2652548340" sldId="262"/>
@@ -382,8 +383,8 @@
           <pc:sldMk cId="2236708295" sldId="263"/>
         </pc:sldMkLst>
       </pc:sldChg>
-      <pc:sldChg chg="add">
-        <pc:chgData name="Dinh Vinh Mai" userId="b8e4a559-41e0-4141-8dc1-330451d69615" providerId="ADAL" clId="{92C8C979-F545-4FFE-B472-387B21A78BD7}" dt="2024-07-12T04:10:58.730" v="7617" actId="2890"/>
+      <pc:sldChg chg="add del">
+        <pc:chgData name="Dinh Vinh Mai" userId="b8e4a559-41e0-4141-8dc1-330451d69615" providerId="ADAL" clId="{92C8C979-F545-4FFE-B472-387B21A78BD7}" dt="2024-07-12T10:33:09.639" v="9647" actId="47"/>
         <pc:sldMkLst>
           <pc:docMk/>
           <pc:sldMk cId="3771300892" sldId="263"/>
@@ -396,8 +397,8 @@
           <pc:sldMk cId="193709571" sldId="264"/>
         </pc:sldMkLst>
       </pc:sldChg>
-      <pc:sldChg chg="delSp modSp add mod">
-        <pc:chgData name="Dinh Vinh Mai" userId="b8e4a559-41e0-4141-8dc1-330451d69615" providerId="ADAL" clId="{92C8C979-F545-4FFE-B472-387B21A78BD7}" dt="2024-07-12T04:31:40.463" v="9627" actId="115"/>
+      <pc:sldChg chg="delSp modSp add mod modAnim">
+        <pc:chgData name="Dinh Vinh Mai" userId="b8e4a559-41e0-4141-8dc1-330451d69615" providerId="ADAL" clId="{92C8C979-F545-4FFE-B472-387B21A78BD7}" dt="2024-07-12T10:33:34.650" v="9654"/>
         <pc:sldMkLst>
           <pc:docMk/>
           <pc:sldMk cId="1570693514" sldId="264"/>
@@ -411,7 +412,7 @@
           </ac:spMkLst>
         </pc:spChg>
         <pc:spChg chg="mod">
-          <ac:chgData name="Dinh Vinh Mai" userId="b8e4a559-41e0-4141-8dc1-330451d69615" providerId="ADAL" clId="{92C8C979-F545-4FFE-B472-387B21A78BD7}" dt="2024-07-12T04:31:40.463" v="9627" actId="115"/>
+          <ac:chgData name="Dinh Vinh Mai" userId="b8e4a559-41e0-4141-8dc1-330451d69615" providerId="ADAL" clId="{92C8C979-F545-4FFE-B472-387B21A78BD7}" dt="2024-07-12T10:33:29.941" v="9653" actId="20577"/>
           <ac:spMkLst>
             <pc:docMk/>
             <pc:sldMk cId="1570693514" sldId="264"/>
@@ -443,12 +444,82 @@
           </ac:picMkLst>
         </pc:picChg>
       </pc:sldChg>
+      <pc:sldChg chg="addSp modSp add mod modAnim">
+        <pc:chgData name="Dinh Vinh Mai" userId="b8e4a559-41e0-4141-8dc1-330451d69615" providerId="ADAL" clId="{92C8C979-F545-4FFE-B472-387B21A78BD7}" dt="2024-07-13T00:25:14.362" v="10864" actId="255"/>
+        <pc:sldMkLst>
+          <pc:docMk/>
+          <pc:sldMk cId="2598762935" sldId="265"/>
+        </pc:sldMkLst>
+        <pc:spChg chg="add mod">
+          <ac:chgData name="Dinh Vinh Mai" userId="b8e4a559-41e0-4141-8dc1-330451d69615" providerId="ADAL" clId="{92C8C979-F545-4FFE-B472-387B21A78BD7}" dt="2024-07-13T00:25:14.362" v="10864" actId="255"/>
+          <ac:spMkLst>
+            <pc:docMk/>
+            <pc:sldMk cId="2598762935" sldId="265"/>
+            <ac:spMk id="2" creationId="{F8B4EBA5-D065-6628-05A5-91C8183330F5}"/>
+          </ac:spMkLst>
+        </pc:spChg>
+        <pc:spChg chg="mod">
+          <ac:chgData name="Dinh Vinh Mai" userId="b8e4a559-41e0-4141-8dc1-330451d69615" providerId="ADAL" clId="{92C8C979-F545-4FFE-B472-387B21A78BD7}" dt="2024-07-13T00:18:11.297" v="10690" actId="114"/>
+          <ac:spMkLst>
+            <pc:docMk/>
+            <pc:sldMk cId="2598762935" sldId="265"/>
+            <ac:spMk id="3" creationId="{96DD8BC4-D539-661E-8A88-53AF6C208F93}"/>
+          </ac:spMkLst>
+        </pc:spChg>
+        <pc:spChg chg="mod">
+          <ac:chgData name="Dinh Vinh Mai" userId="b8e4a559-41e0-4141-8dc1-330451d69615" providerId="ADAL" clId="{92C8C979-F545-4FFE-B472-387B21A78BD7}" dt="2024-07-12T10:31:48.719" v="9633" actId="20577"/>
+          <ac:spMkLst>
+            <pc:docMk/>
+            <pc:sldMk cId="2598762935" sldId="265"/>
+            <ac:spMk id="4" creationId="{BBA13038-CAB8-FCA0-CDE8-65E40C2F10A3}"/>
+          </ac:spMkLst>
+        </pc:spChg>
+      </pc:sldChg>
       <pc:sldChg chg="del">
         <pc:chgData name="Dinh Vinh Mai" userId="b8e4a559-41e0-4141-8dc1-330451d69615" providerId="ADAL" clId="{92C8C979-F545-4FFE-B472-387B21A78BD7}" dt="2024-07-11T23:42:41.844" v="0" actId="47"/>
         <pc:sldMkLst>
           <pc:docMk/>
           <pc:sldMk cId="3978505155" sldId="265"/>
         </pc:sldMkLst>
+      </pc:sldChg>
+      <pc:sldChg chg="addSp modSp add mod modAnim">
+        <pc:chgData name="Dinh Vinh Mai" userId="b8e4a559-41e0-4141-8dc1-330451d69615" providerId="ADAL" clId="{92C8C979-F545-4FFE-B472-387B21A78BD7}" dt="2024-07-13T02:06:30.052" v="12031" actId="20577"/>
+        <pc:sldMkLst>
+          <pc:docMk/>
+          <pc:sldMk cId="2265539881" sldId="266"/>
+        </pc:sldMkLst>
+        <pc:spChg chg="mod">
+          <ac:chgData name="Dinh Vinh Mai" userId="b8e4a559-41e0-4141-8dc1-330451d69615" providerId="ADAL" clId="{92C8C979-F545-4FFE-B472-387B21A78BD7}" dt="2024-07-13T01:54:27.789" v="11368" actId="14100"/>
+          <ac:spMkLst>
+            <pc:docMk/>
+            <pc:sldMk cId="2265539881" sldId="266"/>
+            <ac:spMk id="2" creationId="{F8B4EBA5-D065-6628-05A5-91C8183330F5}"/>
+          </ac:spMkLst>
+        </pc:spChg>
+        <pc:spChg chg="mod">
+          <ac:chgData name="Dinh Vinh Mai" userId="b8e4a559-41e0-4141-8dc1-330451d69615" providerId="ADAL" clId="{92C8C979-F545-4FFE-B472-387B21A78BD7}" dt="2024-07-13T00:25:47.803" v="10920" actId="20577"/>
+          <ac:spMkLst>
+            <pc:docMk/>
+            <pc:sldMk cId="2265539881" sldId="266"/>
+            <ac:spMk id="3" creationId="{96DD8BC4-D539-661E-8A88-53AF6C208F93}"/>
+          </ac:spMkLst>
+        </pc:spChg>
+        <pc:spChg chg="add mod">
+          <ac:chgData name="Dinh Vinh Mai" userId="b8e4a559-41e0-4141-8dc1-330451d69615" providerId="ADAL" clId="{92C8C979-F545-4FFE-B472-387B21A78BD7}" dt="2024-07-13T02:06:30.052" v="12031" actId="20577"/>
+          <ac:spMkLst>
+            <pc:docMk/>
+            <pc:sldMk cId="2265539881" sldId="266"/>
+            <ac:spMk id="6" creationId="{B6186AA4-73D5-4BB7-63DD-3879981B8F89}"/>
+          </ac:spMkLst>
+        </pc:spChg>
+        <pc:picChg chg="add mod">
+          <ac:chgData name="Dinh Vinh Mai" userId="b8e4a559-41e0-4141-8dc1-330451d69615" providerId="ADAL" clId="{92C8C979-F545-4FFE-B472-387B21A78BD7}" dt="2024-07-13T01:54:30.099" v="11369" actId="1076"/>
+          <ac:picMkLst>
+            <pc:docMk/>
+            <pc:sldMk cId="2265539881" sldId="266"/>
+            <ac:picMk id="1026" creationId="{D65235E0-D979-3771-85A2-93745939C1A2}"/>
+          </ac:picMkLst>
+        </pc:picChg>
       </pc:sldChg>
     </pc:docChg>
   </pc:docChgLst>
@@ -911,7 +982,7 @@
           <a:p>
             <a:fld id="{BAA8DE05-51EE-4692-B197-877FA1DAAAED}" type="datetimeFigureOut">
               <a:rPr lang="en-US" smtClean="0"/>
-              <a:t>7/12/2024</a:t>
+              <a:t>7/13/2024</a:t>
             </a:fld>
             <a:endParaRPr lang="en-US"/>
           </a:p>
@@ -1109,7 +1180,7 @@
           <a:p>
             <a:fld id="{BAA8DE05-51EE-4692-B197-877FA1DAAAED}" type="datetimeFigureOut">
               <a:rPr lang="en-US" smtClean="0"/>
-              <a:t>7/12/2024</a:t>
+              <a:t>7/13/2024</a:t>
             </a:fld>
             <a:endParaRPr lang="en-US"/>
           </a:p>
@@ -1317,7 +1388,7 @@
           <a:p>
             <a:fld id="{BAA8DE05-51EE-4692-B197-877FA1DAAAED}" type="datetimeFigureOut">
               <a:rPr lang="en-US" smtClean="0"/>
-              <a:t>7/12/2024</a:t>
+              <a:t>7/13/2024</a:t>
             </a:fld>
             <a:endParaRPr lang="en-US"/>
           </a:p>
@@ -1515,7 +1586,7 @@
           <a:p>
             <a:fld id="{BAA8DE05-51EE-4692-B197-877FA1DAAAED}" type="datetimeFigureOut">
               <a:rPr lang="en-US" smtClean="0"/>
-              <a:t>7/12/2024</a:t>
+              <a:t>7/13/2024</a:t>
             </a:fld>
             <a:endParaRPr lang="en-US"/>
           </a:p>
@@ -1790,7 +1861,7 @@
           <a:p>
             <a:fld id="{BAA8DE05-51EE-4692-B197-877FA1DAAAED}" type="datetimeFigureOut">
               <a:rPr lang="en-US" smtClean="0"/>
-              <a:t>7/12/2024</a:t>
+              <a:t>7/13/2024</a:t>
             </a:fld>
             <a:endParaRPr lang="en-US"/>
           </a:p>
@@ -2055,7 +2126,7 @@
           <a:p>
             <a:fld id="{BAA8DE05-51EE-4692-B197-877FA1DAAAED}" type="datetimeFigureOut">
               <a:rPr lang="en-US" smtClean="0"/>
-              <a:t>7/12/2024</a:t>
+              <a:t>7/13/2024</a:t>
             </a:fld>
             <a:endParaRPr lang="en-US"/>
           </a:p>
@@ -2467,7 +2538,7 @@
           <a:p>
             <a:fld id="{BAA8DE05-51EE-4692-B197-877FA1DAAAED}" type="datetimeFigureOut">
               <a:rPr lang="en-US" smtClean="0"/>
-              <a:t>7/12/2024</a:t>
+              <a:t>7/13/2024</a:t>
             </a:fld>
             <a:endParaRPr lang="en-US"/>
           </a:p>
@@ -2608,7 +2679,7 @@
           <a:p>
             <a:fld id="{BAA8DE05-51EE-4692-B197-877FA1DAAAED}" type="datetimeFigureOut">
               <a:rPr lang="en-US" smtClean="0"/>
-              <a:t>7/12/2024</a:t>
+              <a:t>7/13/2024</a:t>
             </a:fld>
             <a:endParaRPr lang="en-US"/>
           </a:p>
@@ -2721,7 +2792,7 @@
           <a:p>
             <a:fld id="{BAA8DE05-51EE-4692-B197-877FA1DAAAED}" type="datetimeFigureOut">
               <a:rPr lang="en-US" smtClean="0"/>
-              <a:t>7/12/2024</a:t>
+              <a:t>7/13/2024</a:t>
             </a:fld>
             <a:endParaRPr lang="en-US"/>
           </a:p>
@@ -3032,7 +3103,7 @@
           <a:p>
             <a:fld id="{BAA8DE05-51EE-4692-B197-877FA1DAAAED}" type="datetimeFigureOut">
               <a:rPr lang="en-US" smtClean="0"/>
-              <a:t>7/12/2024</a:t>
+              <a:t>7/13/2024</a:t>
             </a:fld>
             <a:endParaRPr lang="en-US"/>
           </a:p>
@@ -3320,7 +3391,7 @@
           <a:p>
             <a:fld id="{BAA8DE05-51EE-4692-B197-877FA1DAAAED}" type="datetimeFigureOut">
               <a:rPr lang="en-US" smtClean="0"/>
-              <a:t>7/12/2024</a:t>
+              <a:t>7/13/2024</a:t>
             </a:fld>
             <a:endParaRPr lang="en-US"/>
           </a:p>
@@ -3561,7 +3632,7 @@
           <a:p>
             <a:fld id="{BAA8DE05-51EE-4692-B197-877FA1DAAAED}" type="datetimeFigureOut">
               <a:rPr lang="en-US" smtClean="0"/>
-              <a:t>7/12/2024</a:t>
+              <a:t>7/13/2024</a:t>
             </a:fld>
             <a:endParaRPr lang="en-US"/>
           </a:p>
@@ -4934,6 +5005,183 @@
   <p:clrMapOvr>
     <a:masterClrMapping/>
   </p:clrMapOvr>
+  <p:timing>
+    <p:tnLst>
+      <p:par>
+        <p:cTn id="1" dur="indefinite" restart="never" nodeType="tmRoot">
+          <p:childTnLst>
+            <p:seq concurrent="1" nextAc="seek">
+              <p:cTn id="2" dur="indefinite" nodeType="mainSeq">
+                <p:childTnLst>
+                  <p:par>
+                    <p:cTn id="3" fill="hold">
+                      <p:stCondLst>
+                        <p:cond delay="indefinite"/>
+                      </p:stCondLst>
+                      <p:childTnLst>
+                        <p:par>
+                          <p:cTn id="4" fill="hold">
+                            <p:stCondLst>
+                              <p:cond delay="0"/>
+                            </p:stCondLst>
+                            <p:childTnLst>
+                              <p:par>
+                                <p:cTn id="5" presetID="1" presetClass="entr" presetSubtype="0" fill="hold" nodeType="clickEffect">
+                                  <p:stCondLst>
+                                    <p:cond delay="0"/>
+                                  </p:stCondLst>
+                                  <p:childTnLst>
+                                    <p:set>
+                                      <p:cBhvr>
+                                        <p:cTn id="6" dur="1" fill="hold">
+                                          <p:stCondLst>
+                                            <p:cond delay="0"/>
+                                          </p:stCondLst>
+                                        </p:cTn>
+                                        <p:tgtEl>
+                                          <p:spTgt spid="4">
+                                            <p:txEl>
+                                              <p:pRg st="1" end="1"/>
+                                            </p:txEl>
+                                          </p:spTgt>
+                                        </p:tgtEl>
+                                        <p:attrNameLst>
+                                          <p:attrName>style.visibility</p:attrName>
+                                        </p:attrNameLst>
+                                      </p:cBhvr>
+                                      <p:to>
+                                        <p:strVal val="visible"/>
+                                      </p:to>
+                                    </p:set>
+                                  </p:childTnLst>
+                                </p:cTn>
+                              </p:par>
+                            </p:childTnLst>
+                          </p:cTn>
+                        </p:par>
+                      </p:childTnLst>
+                    </p:cTn>
+                  </p:par>
+                  <p:par>
+                    <p:cTn id="7" fill="hold">
+                      <p:stCondLst>
+                        <p:cond delay="indefinite"/>
+                      </p:stCondLst>
+                      <p:childTnLst>
+                        <p:par>
+                          <p:cTn id="8" fill="hold">
+                            <p:stCondLst>
+                              <p:cond delay="0"/>
+                            </p:stCondLst>
+                            <p:childTnLst>
+                              <p:par>
+                                <p:cTn id="9" presetID="1" presetClass="entr" presetSubtype="0" fill="hold" nodeType="clickEffect">
+                                  <p:stCondLst>
+                                    <p:cond delay="0"/>
+                                  </p:stCondLst>
+                                  <p:childTnLst>
+                                    <p:set>
+                                      <p:cBhvr>
+                                        <p:cTn id="10" dur="1" fill="hold">
+                                          <p:stCondLst>
+                                            <p:cond delay="0"/>
+                                          </p:stCondLst>
+                                        </p:cTn>
+                                        <p:tgtEl>
+                                          <p:spTgt spid="4">
+                                            <p:txEl>
+                                              <p:pRg st="2" end="2"/>
+                                            </p:txEl>
+                                          </p:spTgt>
+                                        </p:tgtEl>
+                                        <p:attrNameLst>
+                                          <p:attrName>style.visibility</p:attrName>
+                                        </p:attrNameLst>
+                                      </p:cBhvr>
+                                      <p:to>
+                                        <p:strVal val="visible"/>
+                                      </p:to>
+                                    </p:set>
+                                  </p:childTnLst>
+                                </p:cTn>
+                              </p:par>
+                            </p:childTnLst>
+                          </p:cTn>
+                        </p:par>
+                      </p:childTnLst>
+                    </p:cTn>
+                  </p:par>
+                  <p:par>
+                    <p:cTn id="11" fill="hold">
+                      <p:stCondLst>
+                        <p:cond delay="indefinite"/>
+                      </p:stCondLst>
+                      <p:childTnLst>
+                        <p:par>
+                          <p:cTn id="12" fill="hold">
+                            <p:stCondLst>
+                              <p:cond delay="0"/>
+                            </p:stCondLst>
+                            <p:childTnLst>
+                              <p:par>
+                                <p:cTn id="13" presetID="1" presetClass="entr" presetSubtype="0" fill="hold" nodeType="clickEffect">
+                                  <p:stCondLst>
+                                    <p:cond delay="0"/>
+                                  </p:stCondLst>
+                                  <p:childTnLst>
+                                    <p:set>
+                                      <p:cBhvr>
+                                        <p:cTn id="14" dur="1" fill="hold">
+                                          <p:stCondLst>
+                                            <p:cond delay="0"/>
+                                          </p:stCondLst>
+                                        </p:cTn>
+                                        <p:tgtEl>
+                                          <p:spTgt spid="4">
+                                            <p:txEl>
+                                              <p:pRg st="3" end="3"/>
+                                            </p:txEl>
+                                          </p:spTgt>
+                                        </p:tgtEl>
+                                        <p:attrNameLst>
+                                          <p:attrName>style.visibility</p:attrName>
+                                        </p:attrNameLst>
+                                      </p:cBhvr>
+                                      <p:to>
+                                        <p:strVal val="visible"/>
+                                      </p:to>
+                                    </p:set>
+                                  </p:childTnLst>
+                                </p:cTn>
+                              </p:par>
+                            </p:childTnLst>
+                          </p:cTn>
+                        </p:par>
+                      </p:childTnLst>
+                    </p:cTn>
+                  </p:par>
+                </p:childTnLst>
+              </p:cTn>
+              <p:prevCondLst>
+                <p:cond evt="onPrev" delay="0">
+                  <p:tgtEl>
+                    <p:sldTgt/>
+                  </p:tgtEl>
+                </p:cond>
+              </p:prevCondLst>
+              <p:nextCondLst>
+                <p:cond evt="onNext" delay="0">
+                  <p:tgtEl>
+                    <p:sldTgt/>
+                  </p:tgtEl>
+                </p:cond>
+              </p:nextCondLst>
+            </p:seq>
+          </p:childTnLst>
+        </p:cTn>
+      </p:par>
+    </p:tnLst>
+  </p:timing>
 </p:sld>
 </file>
 
@@ -5238,6 +5486,85 @@
   <p:clrMapOvr>
     <a:masterClrMapping/>
   </p:clrMapOvr>
+  <p:timing>
+    <p:tnLst>
+      <p:par>
+        <p:cTn id="1" dur="indefinite" restart="never" nodeType="tmRoot">
+          <p:childTnLst>
+            <p:seq concurrent="1" nextAc="seek">
+              <p:cTn id="2" dur="indefinite" nodeType="mainSeq">
+                <p:childTnLst>
+                  <p:par>
+                    <p:cTn id="3" fill="hold">
+                      <p:stCondLst>
+                        <p:cond delay="indefinite"/>
+                      </p:stCondLst>
+                      <p:childTnLst>
+                        <p:par>
+                          <p:cTn id="4" fill="hold">
+                            <p:stCondLst>
+                              <p:cond delay="0"/>
+                            </p:stCondLst>
+                            <p:childTnLst>
+                              <p:par>
+                                <p:cTn id="5" presetID="1" presetClass="entr" presetSubtype="0" fill="hold" nodeType="clickEffect">
+                                  <p:stCondLst>
+                                    <p:cond delay="0"/>
+                                  </p:stCondLst>
+                                  <p:childTnLst>
+                                    <p:set>
+                                      <p:cBhvr>
+                                        <p:cTn id="6" dur="1" fill="hold">
+                                          <p:stCondLst>
+                                            <p:cond delay="0"/>
+                                          </p:stCondLst>
+                                        </p:cTn>
+                                        <p:tgtEl>
+                                          <p:spTgt spid="4">
+                                            <p:txEl>
+                                              <p:pRg st="0" end="0"/>
+                                            </p:txEl>
+                                          </p:spTgt>
+                                        </p:tgtEl>
+                                        <p:attrNameLst>
+                                          <p:attrName>style.visibility</p:attrName>
+                                        </p:attrNameLst>
+                                      </p:cBhvr>
+                                      <p:to>
+                                        <p:strVal val="visible"/>
+                                      </p:to>
+                                    </p:set>
+                                  </p:childTnLst>
+                                </p:cTn>
+                              </p:par>
+                            </p:childTnLst>
+                          </p:cTn>
+                        </p:par>
+                      </p:childTnLst>
+                    </p:cTn>
+                  </p:par>
+                </p:childTnLst>
+              </p:cTn>
+              <p:prevCondLst>
+                <p:cond evt="onPrev" delay="0">
+                  <p:tgtEl>
+                    <p:sldTgt/>
+                  </p:tgtEl>
+                </p:cond>
+              </p:prevCondLst>
+              <p:nextCondLst>
+                <p:cond evt="onNext" delay="0">
+                  <p:tgtEl>
+                    <p:sldTgt/>
+                  </p:tgtEl>
+                </p:cond>
+              </p:nextCondLst>
+            </p:seq>
+          </p:childTnLst>
+        </p:cTn>
+      </p:par>
+    </p:tnLst>
+  </p:timing>
 </p:sld>
 </file>
 
@@ -5864,6 +6191,281 @@
   <p:clrMapOvr>
     <a:masterClrMapping/>
   </p:clrMapOvr>
+  <p:timing>
+    <p:tnLst>
+      <p:par>
+        <p:cTn id="1" dur="indefinite" restart="never" nodeType="tmRoot">
+          <p:childTnLst>
+            <p:seq concurrent="1" nextAc="seek">
+              <p:cTn id="2" dur="indefinite" nodeType="mainSeq">
+                <p:childTnLst>
+                  <p:par>
+                    <p:cTn id="3" fill="hold">
+                      <p:stCondLst>
+                        <p:cond delay="indefinite"/>
+                      </p:stCondLst>
+                      <p:childTnLst>
+                        <p:par>
+                          <p:cTn id="4" fill="hold">
+                            <p:stCondLst>
+                              <p:cond delay="0"/>
+                            </p:stCondLst>
+                            <p:childTnLst>
+                              <p:par>
+                                <p:cTn id="5" presetID="1" presetClass="entr" presetSubtype="0" fill="hold" nodeType="clickEffect">
+                                  <p:stCondLst>
+                                    <p:cond delay="0"/>
+                                  </p:stCondLst>
+                                  <p:childTnLst>
+                                    <p:set>
+                                      <p:cBhvr>
+                                        <p:cTn id="6" dur="1" fill="hold">
+                                          <p:stCondLst>
+                                            <p:cond delay="0"/>
+                                          </p:stCondLst>
+                                        </p:cTn>
+                                        <p:tgtEl>
+                                          <p:spTgt spid="4">
+                                            <p:txEl>
+                                              <p:pRg st="0" end="0"/>
+                                            </p:txEl>
+                                          </p:spTgt>
+                                        </p:tgtEl>
+                                        <p:attrNameLst>
+                                          <p:attrName>style.visibility</p:attrName>
+                                        </p:attrNameLst>
+                                      </p:cBhvr>
+                                      <p:to>
+                                        <p:strVal val="visible"/>
+                                      </p:to>
+                                    </p:set>
+                                  </p:childTnLst>
+                                </p:cTn>
+                              </p:par>
+                            </p:childTnLst>
+                          </p:cTn>
+                        </p:par>
+                      </p:childTnLst>
+                    </p:cTn>
+                  </p:par>
+                  <p:par>
+                    <p:cTn id="7" fill="hold">
+                      <p:stCondLst>
+                        <p:cond delay="indefinite"/>
+                      </p:stCondLst>
+                      <p:childTnLst>
+                        <p:par>
+                          <p:cTn id="8" fill="hold">
+                            <p:stCondLst>
+                              <p:cond delay="0"/>
+                            </p:stCondLst>
+                            <p:childTnLst>
+                              <p:par>
+                                <p:cTn id="9" presetID="1" presetClass="entr" presetSubtype="0" fill="hold" nodeType="clickEffect">
+                                  <p:stCondLst>
+                                    <p:cond delay="0"/>
+                                  </p:stCondLst>
+                                  <p:childTnLst>
+                                    <p:set>
+                                      <p:cBhvr>
+                                        <p:cTn id="10" dur="1" fill="hold">
+                                          <p:stCondLst>
+                                            <p:cond delay="0"/>
+                                          </p:stCondLst>
+                                        </p:cTn>
+                                        <p:tgtEl>
+                                          <p:spTgt spid="4">
+                                            <p:txEl>
+                                              <p:pRg st="1" end="1"/>
+                                            </p:txEl>
+                                          </p:spTgt>
+                                        </p:tgtEl>
+                                        <p:attrNameLst>
+                                          <p:attrName>style.visibility</p:attrName>
+                                        </p:attrNameLst>
+                                      </p:cBhvr>
+                                      <p:to>
+                                        <p:strVal val="visible"/>
+                                      </p:to>
+                                    </p:set>
+                                  </p:childTnLst>
+                                </p:cTn>
+                              </p:par>
+                            </p:childTnLst>
+                          </p:cTn>
+                        </p:par>
+                      </p:childTnLst>
+                    </p:cTn>
+                  </p:par>
+                  <p:par>
+                    <p:cTn id="11" fill="hold">
+                      <p:stCondLst>
+                        <p:cond delay="indefinite"/>
+                      </p:stCondLst>
+                      <p:childTnLst>
+                        <p:par>
+                          <p:cTn id="12" fill="hold">
+                            <p:stCondLst>
+                              <p:cond delay="0"/>
+                            </p:stCondLst>
+                            <p:childTnLst>
+                              <p:par>
+                                <p:cTn id="13" presetID="1" presetClass="entr" presetSubtype="0" fill="hold" nodeType="clickEffect">
+                                  <p:stCondLst>
+                                    <p:cond delay="0"/>
+                                  </p:stCondLst>
+                                  <p:childTnLst>
+                                    <p:set>
+                                      <p:cBhvr>
+                                        <p:cTn id="14" dur="1" fill="hold">
+                                          <p:stCondLst>
+                                            <p:cond delay="0"/>
+                                          </p:stCondLst>
+                                        </p:cTn>
+                                        <p:tgtEl>
+                                          <p:spTgt spid="4">
+                                            <p:txEl>
+                                              <p:pRg st="2" end="2"/>
+                                            </p:txEl>
+                                          </p:spTgt>
+                                        </p:tgtEl>
+                                        <p:attrNameLst>
+                                          <p:attrName>style.visibility</p:attrName>
+                                        </p:attrNameLst>
+                                      </p:cBhvr>
+                                      <p:to>
+                                        <p:strVal val="visible"/>
+                                      </p:to>
+                                    </p:set>
+                                  </p:childTnLst>
+                                </p:cTn>
+                              </p:par>
+                            </p:childTnLst>
+                          </p:cTn>
+                        </p:par>
+                      </p:childTnLst>
+                    </p:cTn>
+                  </p:par>
+                  <p:par>
+                    <p:cTn id="15" fill="hold">
+                      <p:stCondLst>
+                        <p:cond delay="indefinite"/>
+                      </p:stCondLst>
+                      <p:childTnLst>
+                        <p:par>
+                          <p:cTn id="16" fill="hold">
+                            <p:stCondLst>
+                              <p:cond delay="0"/>
+                            </p:stCondLst>
+                            <p:childTnLst>
+                              <p:par>
+                                <p:cTn id="17" presetID="1" presetClass="entr" presetSubtype="0" fill="hold" nodeType="clickEffect">
+                                  <p:stCondLst>
+                                    <p:cond delay="0"/>
+                                  </p:stCondLst>
+                                  <p:childTnLst>
+                                    <p:set>
+                                      <p:cBhvr>
+                                        <p:cTn id="18" dur="1" fill="hold">
+                                          <p:stCondLst>
+                                            <p:cond delay="0"/>
+                                          </p:stCondLst>
+                                        </p:cTn>
+                                        <p:tgtEl>
+                                          <p:spTgt spid="4">
+                                            <p:txEl>
+                                              <p:pRg st="3" end="3"/>
+                                            </p:txEl>
+                                          </p:spTgt>
+                                        </p:tgtEl>
+                                        <p:attrNameLst>
+                                          <p:attrName>style.visibility</p:attrName>
+                                        </p:attrNameLst>
+                                      </p:cBhvr>
+                                      <p:to>
+                                        <p:strVal val="visible"/>
+                                      </p:to>
+                                    </p:set>
+                                  </p:childTnLst>
+                                </p:cTn>
+                              </p:par>
+                            </p:childTnLst>
+                          </p:cTn>
+                        </p:par>
+                      </p:childTnLst>
+                    </p:cTn>
+                  </p:par>
+                  <p:par>
+                    <p:cTn id="19" fill="hold">
+                      <p:stCondLst>
+                        <p:cond delay="indefinite"/>
+                      </p:stCondLst>
+                      <p:childTnLst>
+                        <p:par>
+                          <p:cTn id="20" fill="hold">
+                            <p:stCondLst>
+                              <p:cond delay="0"/>
+                            </p:stCondLst>
+                            <p:childTnLst>
+                              <p:par>
+                                <p:cTn id="21" presetID="1" presetClass="entr" presetSubtype="0" fill="hold" nodeType="clickEffect">
+                                  <p:stCondLst>
+                                    <p:cond delay="0"/>
+                                  </p:stCondLst>
+                                  <p:childTnLst>
+                                    <p:set>
+                                      <p:cBhvr>
+                                        <p:cTn id="22" dur="1" fill="hold">
+                                          <p:stCondLst>
+                                            <p:cond delay="0"/>
+                                          </p:stCondLst>
+                                        </p:cTn>
+                                        <p:tgtEl>
+                                          <p:spTgt spid="4">
+                                            <p:txEl>
+                                              <p:pRg st="4" end="4"/>
+                                            </p:txEl>
+                                          </p:spTgt>
+                                        </p:tgtEl>
+                                        <p:attrNameLst>
+                                          <p:attrName>style.visibility</p:attrName>
+                                        </p:attrNameLst>
+                                      </p:cBhvr>
+                                      <p:to>
+                                        <p:strVal val="visible"/>
+                                      </p:to>
+                                    </p:set>
+                                  </p:childTnLst>
+                                </p:cTn>
+                              </p:par>
+                            </p:childTnLst>
+                          </p:cTn>
+                        </p:par>
+                      </p:childTnLst>
+                    </p:cTn>
+                  </p:par>
+                </p:childTnLst>
+              </p:cTn>
+              <p:prevCondLst>
+                <p:cond evt="onPrev" delay="0">
+                  <p:tgtEl>
+                    <p:sldTgt/>
+                  </p:tgtEl>
+                </p:cond>
+              </p:prevCondLst>
+              <p:nextCondLst>
+                <p:cond evt="onNext" delay="0">
+                  <p:tgtEl>
+                    <p:sldTgt/>
+                  </p:tgtEl>
+                </p:cond>
+              </p:nextCondLst>
+            </p:seq>
+          </p:childTnLst>
+        </p:cTn>
+      </p:par>
+    </p:tnLst>
+  </p:timing>
 </p:sld>
 </file>
 
@@ -6833,6 +7435,224 @@
   <p:clrMapOvr>
     <a:masterClrMapping/>
   </p:clrMapOvr>
+  <p:timing>
+    <p:tnLst>
+      <p:par>
+        <p:cTn id="1" dur="indefinite" restart="never" nodeType="tmRoot">
+          <p:childTnLst>
+            <p:seq concurrent="1" nextAc="seek">
+              <p:cTn id="2" dur="indefinite" nodeType="mainSeq">
+                <p:childTnLst>
+                  <p:par>
+                    <p:cTn id="3" fill="hold">
+                      <p:stCondLst>
+                        <p:cond delay="indefinite"/>
+                      </p:stCondLst>
+                      <p:childTnLst>
+                        <p:par>
+                          <p:cTn id="4" fill="hold">
+                            <p:stCondLst>
+                              <p:cond delay="0"/>
+                            </p:stCondLst>
+                            <p:childTnLst>
+                              <p:par>
+                                <p:cTn id="5" presetID="1" presetClass="entr" presetSubtype="0" fill="hold" nodeType="clickEffect">
+                                  <p:stCondLst>
+                                    <p:cond delay="0"/>
+                                  </p:stCondLst>
+                                  <p:childTnLst>
+                                    <p:set>
+                                      <p:cBhvr>
+                                        <p:cTn id="6" dur="1" fill="hold">
+                                          <p:stCondLst>
+                                            <p:cond delay="0"/>
+                                          </p:stCondLst>
+                                        </p:cTn>
+                                        <p:tgtEl>
+                                          <p:spTgt spid="4">
+                                            <p:txEl>
+                                              <p:pRg st="0" end="0"/>
+                                            </p:txEl>
+                                          </p:spTgt>
+                                        </p:tgtEl>
+                                        <p:attrNameLst>
+                                          <p:attrName>style.visibility</p:attrName>
+                                        </p:attrNameLst>
+                                      </p:cBhvr>
+                                      <p:to>
+                                        <p:strVal val="visible"/>
+                                      </p:to>
+                                    </p:set>
+                                  </p:childTnLst>
+                                </p:cTn>
+                              </p:par>
+                            </p:childTnLst>
+                          </p:cTn>
+                        </p:par>
+                      </p:childTnLst>
+                    </p:cTn>
+                  </p:par>
+                  <p:par>
+                    <p:cTn id="7" fill="hold">
+                      <p:stCondLst>
+                        <p:cond delay="indefinite"/>
+                      </p:stCondLst>
+                      <p:childTnLst>
+                        <p:par>
+                          <p:cTn id="8" fill="hold">
+                            <p:stCondLst>
+                              <p:cond delay="0"/>
+                            </p:stCondLst>
+                            <p:childTnLst>
+                              <p:par>
+                                <p:cTn id="9" presetID="1" presetClass="entr" presetSubtype="0" fill="hold" nodeType="clickEffect">
+                                  <p:stCondLst>
+                                    <p:cond delay="0"/>
+                                  </p:stCondLst>
+                                  <p:childTnLst>
+                                    <p:set>
+                                      <p:cBhvr>
+                                        <p:cTn id="10" dur="1" fill="hold">
+                                          <p:stCondLst>
+                                            <p:cond delay="0"/>
+                                          </p:stCondLst>
+                                        </p:cTn>
+                                        <p:tgtEl>
+                                          <p:spTgt spid="6"/>
+                                        </p:tgtEl>
+                                        <p:attrNameLst>
+                                          <p:attrName>style.visibility</p:attrName>
+                                        </p:attrNameLst>
+                                      </p:cBhvr>
+                                      <p:to>
+                                        <p:strVal val="visible"/>
+                                      </p:to>
+                                    </p:set>
+                                  </p:childTnLst>
+                                </p:cTn>
+                              </p:par>
+                            </p:childTnLst>
+                          </p:cTn>
+                        </p:par>
+                      </p:childTnLst>
+                    </p:cTn>
+                  </p:par>
+                  <p:par>
+                    <p:cTn id="11" fill="hold">
+                      <p:stCondLst>
+                        <p:cond delay="indefinite"/>
+                      </p:stCondLst>
+                      <p:childTnLst>
+                        <p:par>
+                          <p:cTn id="12" fill="hold">
+                            <p:stCondLst>
+                              <p:cond delay="0"/>
+                            </p:stCondLst>
+                            <p:childTnLst>
+                              <p:par>
+                                <p:cTn id="13" presetID="1" presetClass="entr" presetSubtype="0" fill="hold" nodeType="clickEffect">
+                                  <p:stCondLst>
+                                    <p:cond delay="0"/>
+                                  </p:stCondLst>
+                                  <p:childTnLst>
+                                    <p:set>
+                                      <p:cBhvr>
+                                        <p:cTn id="14" dur="1" fill="hold">
+                                          <p:stCondLst>
+                                            <p:cond delay="0"/>
+                                          </p:stCondLst>
+                                        </p:cTn>
+                                        <p:tgtEl>
+                                          <p:spTgt spid="9"/>
+                                        </p:tgtEl>
+                                        <p:attrNameLst>
+                                          <p:attrName>style.visibility</p:attrName>
+                                        </p:attrNameLst>
+                                      </p:cBhvr>
+                                      <p:to>
+                                        <p:strVal val="visible"/>
+                                      </p:to>
+                                    </p:set>
+                                  </p:childTnLst>
+                                </p:cTn>
+                              </p:par>
+                            </p:childTnLst>
+                          </p:cTn>
+                        </p:par>
+                      </p:childTnLst>
+                    </p:cTn>
+                  </p:par>
+                  <p:par>
+                    <p:cTn id="15" fill="hold">
+                      <p:stCondLst>
+                        <p:cond delay="indefinite"/>
+                      </p:stCondLst>
+                      <p:childTnLst>
+                        <p:par>
+                          <p:cTn id="16" fill="hold">
+                            <p:stCondLst>
+                              <p:cond delay="0"/>
+                            </p:stCondLst>
+                            <p:childTnLst>
+                              <p:par>
+                                <p:cTn id="17" presetID="1" presetClass="entr" presetSubtype="0" fill="hold" nodeType="clickEffect">
+                                  <p:stCondLst>
+                                    <p:cond delay="0"/>
+                                  </p:stCondLst>
+                                  <p:childTnLst>
+                                    <p:set>
+                                      <p:cBhvr>
+                                        <p:cTn id="18" dur="1" fill="hold">
+                                          <p:stCondLst>
+                                            <p:cond delay="0"/>
+                                          </p:stCondLst>
+                                        </p:cTn>
+                                        <p:tgtEl>
+                                          <p:spTgt spid="10">
+                                            <p:txEl>
+                                              <p:pRg st="0" end="0"/>
+                                            </p:txEl>
+                                          </p:spTgt>
+                                        </p:tgtEl>
+                                        <p:attrNameLst>
+                                          <p:attrName>style.visibility</p:attrName>
+                                        </p:attrNameLst>
+                                      </p:cBhvr>
+                                      <p:to>
+                                        <p:strVal val="visible"/>
+                                      </p:to>
+                                    </p:set>
+                                  </p:childTnLst>
+                                </p:cTn>
+                              </p:par>
+                            </p:childTnLst>
+                          </p:cTn>
+                        </p:par>
+                      </p:childTnLst>
+                    </p:cTn>
+                  </p:par>
+                </p:childTnLst>
+              </p:cTn>
+              <p:prevCondLst>
+                <p:cond evt="onPrev" delay="0">
+                  <p:tgtEl>
+                    <p:sldTgt/>
+                  </p:tgtEl>
+                </p:cond>
+              </p:prevCondLst>
+              <p:nextCondLst>
+                <p:cond evt="onNext" delay="0">
+                  <p:tgtEl>
+                    <p:sldTgt/>
+                  </p:tgtEl>
+                </p:cond>
+              </p:nextCondLst>
+            </p:seq>
+          </p:childTnLst>
+        </p:cTn>
+      </p:par>
+    </p:tnLst>
+  </p:timing>
 </p:sld>
 </file>
 
@@ -6887,7 +7707,7 @@
             </a:r>
             <a:r>
               <a:rPr lang="en-GB" sz="1800" b="1" i="1"/>
-              <a:t>3.5.2 – Command Line Argument</a:t>
+              <a:t>3.5.3 – The end of “main” function</a:t>
             </a:r>
             <a:endParaRPr lang="en-US" sz="1800"/>
           </a:p>
@@ -6910,7 +7730,7 @@
         <p:spPr>
           <a:xfrm>
             <a:off x="0" y="820738"/>
-            <a:ext cx="12192000" cy="620712"/>
+            <a:ext cx="12192000" cy="6037262"/>
           </a:xfrm>
           <a:prstGeom prst="rect">
             <a:avLst/>
@@ -7091,20 +7911,38 @@
             </a:pPr>
             <a:r>
               <a:rPr lang="en-GB" sz="1800"/>
-              <a:t>It is possible to pass any number of arguments while executing a class by specifying each of the arguments right after the execution command in the command line </a:t>
-            </a:r>
-            <a:r>
-              <a:rPr lang="en-GB" sz="900" b="1" i="1"/>
-              <a:t>(Demonstrate code and explain)</a:t>
-            </a:r>
-            <a:endParaRPr lang="en-GB" sz="1800" b="1" i="1"/>
+              <a:t>JVM understands that the Java program is run when the “main” method is called =&gt; However, the end of “main” method doesn’t indicate the end of an entire program (it depends on what is inside of “main” method)</a:t>
+            </a:r>
           </a:p>
           <a:p>
             <a:pPr marL="285750" indent="-285750" algn="l">
               <a:buFontTx/>
               <a:buChar char="-"/>
             </a:pPr>
-            <a:endParaRPr lang="en-GB" sz="1800" b="1" i="1"/>
+            <a:r>
+              <a:rPr lang="en-GB" sz="1800"/>
+              <a:t>If the Java program is simple with just some printing things and looping things =&gt; the end of “main” method is the end of the entire program since there are nothing else to do</a:t>
+            </a:r>
+          </a:p>
+          <a:p>
+            <a:pPr marL="285750" indent="-285750" algn="l">
+              <a:buFontTx/>
+              <a:buChar char="-"/>
+            </a:pPr>
+            <a:r>
+              <a:rPr lang="en-GB" sz="1800"/>
+              <a:t>However, Java program is a combination of many classes interact with each other =&gt; the “main” method is where each object of each class is created and their method would be called and interact further =&gt; the “main” method could reach to the end, but, the program doesn’t since the interaction between the objects created from “main” hasn’ stopped yet</a:t>
+            </a:r>
+          </a:p>
+          <a:p>
+            <a:pPr marL="285750" indent="-285750" algn="l">
+              <a:buFontTx/>
+              <a:buChar char="-"/>
+            </a:pPr>
+            <a:r>
+              <a:rPr lang="en-GB" sz="1800" i="1"/>
+              <a:t>E.g: Java FileIO APIs (file opening and closing even after the “main” method has reached the end” )</a:t>
+            </a:r>
           </a:p>
           <a:p>
             <a:pPr marL="285750" indent="-285750" algn="l">
@@ -7315,36 +8153,6 @@
           </a:p>
         </p:txBody>
       </p:sp>
-      <p:pic>
-        <p:nvPicPr>
-          <p:cNvPr id="6" name="Picture 5">
-            <a:extLst>
-              <a:ext uri="{FF2B5EF4-FFF2-40B4-BE49-F238E27FC236}">
-                <a16:creationId xmlns:a16="http://schemas.microsoft.com/office/drawing/2014/main" id="{9A19FCA6-E051-B4ED-594D-4253C3A806EB}"/>
-              </a:ext>
-            </a:extLst>
-          </p:cNvPr>
-          <p:cNvPicPr>
-            <a:picLocks noChangeAspect="1"/>
-          </p:cNvPicPr>
-          <p:nvPr/>
-        </p:nvPicPr>
-        <p:blipFill>
-          <a:blip r:embed="rId2"/>
-          <a:stretch>
-            <a:fillRect/>
-          </a:stretch>
-        </p:blipFill>
-        <p:spPr>
-          <a:xfrm>
-            <a:off x="895350" y="1504157"/>
-            <a:ext cx="3924848" cy="495369"/>
-          </a:xfrm>
-          <a:prstGeom prst="rect">
-            <a:avLst/>
-          </a:prstGeom>
-        </p:spPr>
-      </p:pic>
       <p:sp>
         <p:nvSpPr>
           <p:cNvPr id="7" name="Subtitle 2">
@@ -7552,256 +8360,242 @@
           </a:p>
         </p:txBody>
       </p:sp>
-      <p:pic>
-        <p:nvPicPr>
-          <p:cNvPr id="9" name="Picture 8">
-            <a:extLst>
-              <a:ext uri="{FF2B5EF4-FFF2-40B4-BE49-F238E27FC236}">
-                <a16:creationId xmlns:a16="http://schemas.microsoft.com/office/drawing/2014/main" id="{33F450F7-DDCB-CF0B-F9B7-30642AC9675A}"/>
-              </a:ext>
-            </a:extLst>
-          </p:cNvPr>
-          <p:cNvPicPr>
-            <a:picLocks noChangeAspect="1"/>
-          </p:cNvPicPr>
-          <p:nvPr/>
-        </p:nvPicPr>
-        <p:blipFill>
-          <a:blip r:embed="rId3"/>
-          <a:stretch>
-            <a:fillRect/>
-          </a:stretch>
-        </p:blipFill>
-        <p:spPr>
-          <a:xfrm>
-            <a:off x="679449" y="2286396"/>
-            <a:ext cx="6284537" cy="3924697"/>
-          </a:xfrm>
-          <a:prstGeom prst="rect">
-            <a:avLst/>
-          </a:prstGeom>
-        </p:spPr>
-      </p:pic>
-      <p:sp>
-        <p:nvSpPr>
-          <p:cNvPr id="10" name="Subtitle 2">
-            <a:extLst>
-              <a:ext uri="{FF2B5EF4-FFF2-40B4-BE49-F238E27FC236}">
-                <a16:creationId xmlns:a16="http://schemas.microsoft.com/office/drawing/2014/main" id="{14A7A41A-4834-004B-3719-DD1CCDAAC9DC}"/>
-              </a:ext>
-            </a:extLst>
-          </p:cNvPr>
-          <p:cNvSpPr txBox="1">
-            <a:spLocks/>
-          </p:cNvSpPr>
-          <p:nvPr/>
-        </p:nvSpPr>
-        <p:spPr>
-          <a:xfrm>
-            <a:off x="7275830" y="2286396"/>
-            <a:ext cx="4306570" cy="4068730"/>
-          </a:xfrm>
-          <a:prstGeom prst="rect">
-            <a:avLst/>
-          </a:prstGeom>
-        </p:spPr>
-        <p:txBody>
-          <a:bodyPr vert="horz" lIns="91440" tIns="45720" rIns="91440" bIns="45720" rtlCol="0">
-            <a:normAutofit/>
-          </a:bodyPr>
-          <a:lstStyle>
-            <a:lvl1pPr marL="0" indent="0" algn="ctr" defTabSz="914400" rtl="0" eaLnBrk="1" latinLnBrk="0" hangingPunct="1">
-              <a:lnSpc>
-                <a:spcPct val="90000"/>
-              </a:lnSpc>
-              <a:spcBef>
-                <a:spcPts val="1000"/>
-              </a:spcBef>
-              <a:buFont typeface="Arial" panose="020B0604020202020204" pitchFamily="34" charset="0"/>
-              <a:buNone/>
-              <a:defRPr sz="2400" kern="1200">
-                <a:solidFill>
-                  <a:schemeClr val="tx1"/>
-                </a:solidFill>
-                <a:latin typeface="+mn-lt"/>
-                <a:ea typeface="+mn-ea"/>
-                <a:cs typeface="+mn-cs"/>
-              </a:defRPr>
-            </a:lvl1pPr>
-            <a:lvl2pPr marL="457200" indent="0" algn="ctr" defTabSz="914400" rtl="0" eaLnBrk="1" latinLnBrk="0" hangingPunct="1">
-              <a:lnSpc>
-                <a:spcPct val="90000"/>
-              </a:lnSpc>
-              <a:spcBef>
-                <a:spcPts val="500"/>
-              </a:spcBef>
-              <a:buFont typeface="Arial" panose="020B0604020202020204" pitchFamily="34" charset="0"/>
-              <a:buNone/>
-              <a:defRPr sz="2000" kern="1200">
-                <a:solidFill>
-                  <a:schemeClr val="tx1"/>
-                </a:solidFill>
-                <a:latin typeface="+mn-lt"/>
-                <a:ea typeface="+mn-ea"/>
-                <a:cs typeface="+mn-cs"/>
-              </a:defRPr>
-            </a:lvl2pPr>
-            <a:lvl3pPr marL="914400" indent="0" algn="ctr" defTabSz="914400" rtl="0" eaLnBrk="1" latinLnBrk="0" hangingPunct="1">
-              <a:lnSpc>
-                <a:spcPct val="90000"/>
-              </a:lnSpc>
-              <a:spcBef>
-                <a:spcPts val="500"/>
-              </a:spcBef>
-              <a:buFont typeface="Arial" panose="020B0604020202020204" pitchFamily="34" charset="0"/>
-              <a:buNone/>
-              <a:defRPr sz="1800" kern="1200">
-                <a:solidFill>
-                  <a:schemeClr val="tx1"/>
-                </a:solidFill>
-                <a:latin typeface="+mn-lt"/>
-                <a:ea typeface="+mn-ea"/>
-                <a:cs typeface="+mn-cs"/>
-              </a:defRPr>
-            </a:lvl3pPr>
-            <a:lvl4pPr marL="1371600" indent="0" algn="ctr" defTabSz="914400" rtl="0" eaLnBrk="1" latinLnBrk="0" hangingPunct="1">
-              <a:lnSpc>
-                <a:spcPct val="90000"/>
-              </a:lnSpc>
-              <a:spcBef>
-                <a:spcPts val="500"/>
-              </a:spcBef>
-              <a:buFont typeface="Arial" panose="020B0604020202020204" pitchFamily="34" charset="0"/>
-              <a:buNone/>
-              <a:defRPr sz="1600" kern="1200">
-                <a:solidFill>
-                  <a:schemeClr val="tx1"/>
-                </a:solidFill>
-                <a:latin typeface="+mn-lt"/>
-                <a:ea typeface="+mn-ea"/>
-                <a:cs typeface="+mn-cs"/>
-              </a:defRPr>
-            </a:lvl4pPr>
-            <a:lvl5pPr marL="1828800" indent="0" algn="ctr" defTabSz="914400" rtl="0" eaLnBrk="1" latinLnBrk="0" hangingPunct="1">
-              <a:lnSpc>
-                <a:spcPct val="90000"/>
-              </a:lnSpc>
-              <a:spcBef>
-                <a:spcPts val="500"/>
-              </a:spcBef>
-              <a:buFont typeface="Arial" panose="020B0604020202020204" pitchFamily="34" charset="0"/>
-              <a:buNone/>
-              <a:defRPr sz="1600" kern="1200">
-                <a:solidFill>
-                  <a:schemeClr val="tx1"/>
-                </a:solidFill>
-                <a:latin typeface="+mn-lt"/>
-                <a:ea typeface="+mn-ea"/>
-                <a:cs typeface="+mn-cs"/>
-              </a:defRPr>
-            </a:lvl5pPr>
-            <a:lvl6pPr marL="2286000" indent="0" algn="ctr" defTabSz="914400" rtl="0" eaLnBrk="1" latinLnBrk="0" hangingPunct="1">
-              <a:lnSpc>
-                <a:spcPct val="90000"/>
-              </a:lnSpc>
-              <a:spcBef>
-                <a:spcPts val="500"/>
-              </a:spcBef>
-              <a:buFont typeface="Arial" panose="020B0604020202020204" pitchFamily="34" charset="0"/>
-              <a:buNone/>
-              <a:defRPr sz="1600" kern="1200">
-                <a:solidFill>
-                  <a:schemeClr val="tx1"/>
-                </a:solidFill>
-                <a:latin typeface="+mn-lt"/>
-                <a:ea typeface="+mn-ea"/>
-                <a:cs typeface="+mn-cs"/>
-              </a:defRPr>
-            </a:lvl6pPr>
-            <a:lvl7pPr marL="2743200" indent="0" algn="ctr" defTabSz="914400" rtl="0" eaLnBrk="1" latinLnBrk="0" hangingPunct="1">
-              <a:lnSpc>
-                <a:spcPct val="90000"/>
-              </a:lnSpc>
-              <a:spcBef>
-                <a:spcPts val="500"/>
-              </a:spcBef>
-              <a:buFont typeface="Arial" panose="020B0604020202020204" pitchFamily="34" charset="0"/>
-              <a:buNone/>
-              <a:defRPr sz="1600" kern="1200">
-                <a:solidFill>
-                  <a:schemeClr val="tx1"/>
-                </a:solidFill>
-                <a:latin typeface="+mn-lt"/>
-                <a:ea typeface="+mn-ea"/>
-                <a:cs typeface="+mn-cs"/>
-              </a:defRPr>
-            </a:lvl7pPr>
-            <a:lvl8pPr marL="3200400" indent="0" algn="ctr" defTabSz="914400" rtl="0" eaLnBrk="1" latinLnBrk="0" hangingPunct="1">
-              <a:lnSpc>
-                <a:spcPct val="90000"/>
-              </a:lnSpc>
-              <a:spcBef>
-                <a:spcPts val="500"/>
-              </a:spcBef>
-              <a:buFont typeface="Arial" panose="020B0604020202020204" pitchFamily="34" charset="0"/>
-              <a:buNone/>
-              <a:defRPr sz="1600" kern="1200">
-                <a:solidFill>
-                  <a:schemeClr val="tx1"/>
-                </a:solidFill>
-                <a:latin typeface="+mn-lt"/>
-                <a:ea typeface="+mn-ea"/>
-                <a:cs typeface="+mn-cs"/>
-              </a:defRPr>
-            </a:lvl8pPr>
-            <a:lvl9pPr marL="3657600" indent="0" algn="ctr" defTabSz="914400" rtl="0" eaLnBrk="1" latinLnBrk="0" hangingPunct="1">
-              <a:lnSpc>
-                <a:spcPct val="90000"/>
-              </a:lnSpc>
-              <a:spcBef>
-                <a:spcPts val="500"/>
-              </a:spcBef>
-              <a:buFont typeface="Arial" panose="020B0604020202020204" pitchFamily="34" charset="0"/>
-              <a:buNone/>
-              <a:defRPr sz="1600" kern="1200">
-                <a:solidFill>
-                  <a:schemeClr val="tx1"/>
-                </a:solidFill>
-                <a:latin typeface="+mn-lt"/>
-                <a:ea typeface="+mn-ea"/>
-                <a:cs typeface="+mn-cs"/>
-              </a:defRPr>
-            </a:lvl9pPr>
-          </a:lstStyle>
-          <a:p>
-            <a:pPr marL="285750" indent="-285750" algn="l">
-              <a:buFontTx/>
-              <a:buChar char="-"/>
-            </a:pPr>
-            <a:r>
-              <a:rPr lang="en-GB" sz="1800"/>
-              <a:t>Fact: The reason why the class name is not passed as an argument to the “main” method is because that the “.class” file name will always the same with the class name of the Java Program =&gt; the “.class” file name is not changeable =&gt; “main” method always know the name of the class containing it. </a:t>
-            </a:r>
-          </a:p>
-          <a:p>
-            <a:pPr marL="285750" indent="-285750" algn="l">
-              <a:buFontTx/>
-              <a:buChar char="-"/>
-            </a:pPr>
-            <a:endParaRPr lang="en-GB" sz="1000" i="1"/>
-          </a:p>
-        </p:txBody>
-      </p:sp>
     </p:spTree>
     <p:extLst>
       <p:ext uri="{BB962C8B-B14F-4D97-AF65-F5344CB8AC3E}">
-        <p14:creationId xmlns:p14="http://schemas.microsoft.com/office/powerpoint/2010/main" val="3771300892"/>
+        <p14:creationId xmlns:p14="http://schemas.microsoft.com/office/powerpoint/2010/main" val="1570693514"/>
       </p:ext>
     </p:extLst>
   </p:cSld>
   <p:clrMapOvr>
     <a:masterClrMapping/>
   </p:clrMapOvr>
+  <p:timing>
+    <p:tnLst>
+      <p:par>
+        <p:cTn id="1" dur="indefinite" restart="never" nodeType="tmRoot">
+          <p:childTnLst>
+            <p:seq concurrent="1" nextAc="seek">
+              <p:cTn id="2" dur="indefinite" nodeType="mainSeq">
+                <p:childTnLst>
+                  <p:par>
+                    <p:cTn id="3" fill="hold">
+                      <p:stCondLst>
+                        <p:cond delay="indefinite"/>
+                      </p:stCondLst>
+                      <p:childTnLst>
+                        <p:par>
+                          <p:cTn id="4" fill="hold">
+                            <p:stCondLst>
+                              <p:cond delay="0"/>
+                            </p:stCondLst>
+                            <p:childTnLst>
+                              <p:par>
+                                <p:cTn id="5" presetID="1" presetClass="entr" presetSubtype="0" fill="hold" nodeType="clickEffect">
+                                  <p:stCondLst>
+                                    <p:cond delay="0"/>
+                                  </p:stCondLst>
+                                  <p:childTnLst>
+                                    <p:set>
+                                      <p:cBhvr>
+                                        <p:cTn id="6" dur="1" fill="hold">
+                                          <p:stCondLst>
+                                            <p:cond delay="0"/>
+                                          </p:stCondLst>
+                                        </p:cTn>
+                                        <p:tgtEl>
+                                          <p:spTgt spid="4">
+                                            <p:txEl>
+                                              <p:pRg st="0" end="0"/>
+                                            </p:txEl>
+                                          </p:spTgt>
+                                        </p:tgtEl>
+                                        <p:attrNameLst>
+                                          <p:attrName>style.visibility</p:attrName>
+                                        </p:attrNameLst>
+                                      </p:cBhvr>
+                                      <p:to>
+                                        <p:strVal val="visible"/>
+                                      </p:to>
+                                    </p:set>
+                                  </p:childTnLst>
+                                </p:cTn>
+                              </p:par>
+                            </p:childTnLst>
+                          </p:cTn>
+                        </p:par>
+                      </p:childTnLst>
+                    </p:cTn>
+                  </p:par>
+                  <p:par>
+                    <p:cTn id="7" fill="hold">
+                      <p:stCondLst>
+                        <p:cond delay="indefinite"/>
+                      </p:stCondLst>
+                      <p:childTnLst>
+                        <p:par>
+                          <p:cTn id="8" fill="hold">
+                            <p:stCondLst>
+                              <p:cond delay="0"/>
+                            </p:stCondLst>
+                            <p:childTnLst>
+                              <p:par>
+                                <p:cTn id="9" presetID="1" presetClass="entr" presetSubtype="0" fill="hold" nodeType="clickEffect">
+                                  <p:stCondLst>
+                                    <p:cond delay="0"/>
+                                  </p:stCondLst>
+                                  <p:childTnLst>
+                                    <p:set>
+                                      <p:cBhvr>
+                                        <p:cTn id="10" dur="1" fill="hold">
+                                          <p:stCondLst>
+                                            <p:cond delay="0"/>
+                                          </p:stCondLst>
+                                        </p:cTn>
+                                        <p:tgtEl>
+                                          <p:spTgt spid="4">
+                                            <p:txEl>
+                                              <p:pRg st="1" end="1"/>
+                                            </p:txEl>
+                                          </p:spTgt>
+                                        </p:tgtEl>
+                                        <p:attrNameLst>
+                                          <p:attrName>style.visibility</p:attrName>
+                                        </p:attrNameLst>
+                                      </p:cBhvr>
+                                      <p:to>
+                                        <p:strVal val="visible"/>
+                                      </p:to>
+                                    </p:set>
+                                  </p:childTnLst>
+                                </p:cTn>
+                              </p:par>
+                            </p:childTnLst>
+                          </p:cTn>
+                        </p:par>
+                      </p:childTnLst>
+                    </p:cTn>
+                  </p:par>
+                  <p:par>
+                    <p:cTn id="11" fill="hold">
+                      <p:stCondLst>
+                        <p:cond delay="indefinite"/>
+                      </p:stCondLst>
+                      <p:childTnLst>
+                        <p:par>
+                          <p:cTn id="12" fill="hold">
+                            <p:stCondLst>
+                              <p:cond delay="0"/>
+                            </p:stCondLst>
+                            <p:childTnLst>
+                              <p:par>
+                                <p:cTn id="13" presetID="1" presetClass="entr" presetSubtype="0" fill="hold" nodeType="clickEffect">
+                                  <p:stCondLst>
+                                    <p:cond delay="0"/>
+                                  </p:stCondLst>
+                                  <p:childTnLst>
+                                    <p:set>
+                                      <p:cBhvr>
+                                        <p:cTn id="14" dur="1" fill="hold">
+                                          <p:stCondLst>
+                                            <p:cond delay="0"/>
+                                          </p:stCondLst>
+                                        </p:cTn>
+                                        <p:tgtEl>
+                                          <p:spTgt spid="4">
+                                            <p:txEl>
+                                              <p:pRg st="2" end="2"/>
+                                            </p:txEl>
+                                          </p:spTgt>
+                                        </p:tgtEl>
+                                        <p:attrNameLst>
+                                          <p:attrName>style.visibility</p:attrName>
+                                        </p:attrNameLst>
+                                      </p:cBhvr>
+                                      <p:to>
+                                        <p:strVal val="visible"/>
+                                      </p:to>
+                                    </p:set>
+                                  </p:childTnLst>
+                                </p:cTn>
+                              </p:par>
+                            </p:childTnLst>
+                          </p:cTn>
+                        </p:par>
+                      </p:childTnLst>
+                    </p:cTn>
+                  </p:par>
+                  <p:par>
+                    <p:cTn id="15" fill="hold">
+                      <p:stCondLst>
+                        <p:cond delay="indefinite"/>
+                      </p:stCondLst>
+                      <p:childTnLst>
+                        <p:par>
+                          <p:cTn id="16" fill="hold">
+                            <p:stCondLst>
+                              <p:cond delay="0"/>
+                            </p:stCondLst>
+                            <p:childTnLst>
+                              <p:par>
+                                <p:cTn id="17" presetID="1" presetClass="entr" presetSubtype="0" fill="hold" nodeType="clickEffect">
+                                  <p:stCondLst>
+                                    <p:cond delay="0"/>
+                                  </p:stCondLst>
+                                  <p:childTnLst>
+                                    <p:set>
+                                      <p:cBhvr>
+                                        <p:cTn id="18" dur="1" fill="hold">
+                                          <p:stCondLst>
+                                            <p:cond delay="0"/>
+                                          </p:stCondLst>
+                                        </p:cTn>
+                                        <p:tgtEl>
+                                          <p:spTgt spid="4">
+                                            <p:txEl>
+                                              <p:pRg st="3" end="3"/>
+                                            </p:txEl>
+                                          </p:spTgt>
+                                        </p:tgtEl>
+                                        <p:attrNameLst>
+                                          <p:attrName>style.visibility</p:attrName>
+                                        </p:attrNameLst>
+                                      </p:cBhvr>
+                                      <p:to>
+                                        <p:strVal val="visible"/>
+                                      </p:to>
+                                    </p:set>
+                                  </p:childTnLst>
+                                </p:cTn>
+                              </p:par>
+                            </p:childTnLst>
+                          </p:cTn>
+                        </p:par>
+                      </p:childTnLst>
+                    </p:cTn>
+                  </p:par>
+                </p:childTnLst>
+              </p:cTn>
+              <p:prevCondLst>
+                <p:cond evt="onPrev" delay="0">
+                  <p:tgtEl>
+                    <p:sldTgt/>
+                  </p:tgtEl>
+                </p:cond>
+              </p:prevCondLst>
+              <p:nextCondLst>
+                <p:cond evt="onNext" delay="0">
+                  <p:tgtEl>
+                    <p:sldTgt/>
+                  </p:tgtEl>
+                </p:cond>
+              </p:nextCondLst>
+            </p:seq>
+          </p:childTnLst>
+        </p:cTn>
+      </p:par>
+    </p:tnLst>
+  </p:timing>
 </p:sld>
 </file>
 
@@ -7846,19 +8640,18 @@
         </p:spPr>
         <p:txBody>
           <a:bodyPr>
-            <a:normAutofit fontScale="85000" lnSpcReduction="10000"/>
+            <a:normAutofit fontScale="92500" lnSpcReduction="20000"/>
           </a:bodyPr>
           <a:lstStyle/>
           <a:p>
             <a:r>
-              <a:rPr lang="en-GB" sz="1800"/>
-              <a:t>3.5 – Understanding the “MAIN” method: </a:t>
-            </a:r>
-            <a:r>
-              <a:rPr lang="en-GB" sz="1800" b="1" i="1"/>
-              <a:t>3.5.3 – The end of “main” function</a:t>
-            </a:r>
-            <a:endParaRPr lang="en-US" sz="1800"/>
+              <a:rPr lang="en-US" sz="1800"/>
+              <a:t>3.6 Object-Oriented Programming – </a:t>
+            </a:r>
+            <a:r>
+              <a:rPr lang="en-US" sz="1800" b="1" i="1"/>
+              <a:t>“APIE”</a:t>
+            </a:r>
           </a:p>
         </p:txBody>
       </p:sp>
@@ -8058,62 +8851,6 @@
               <a:buFontTx/>
               <a:buChar char="-"/>
             </a:pPr>
-            <a:r>
-              <a:rPr lang="en-GB" sz="1800"/>
-              <a:t>JVM understands that the Java program is run when the “main” method is called =&gt; However, the end of “main” method doesn’t indicate the end of an entire program (it depends on what is inside of “main” method)</a:t>
-            </a:r>
-          </a:p>
-          <a:p>
-            <a:pPr marL="285750" indent="-285750" algn="l">
-              <a:buFontTx/>
-              <a:buChar char="-"/>
-            </a:pPr>
-            <a:r>
-              <a:rPr lang="en-GB" sz="1800"/>
-              <a:t>If the Java program is simple with just some printing things and looping things =&gt; the end of “main” method is the end of the entire program since there are nothing else to do</a:t>
-            </a:r>
-          </a:p>
-          <a:p>
-            <a:pPr marL="285750" indent="-285750" algn="l">
-              <a:buFontTx/>
-              <a:buChar char="-"/>
-            </a:pPr>
-            <a:r>
-              <a:rPr lang="en-GB" sz="1800"/>
-              <a:t>However, Java program is a combination of many classes interact with each other =&gt; the “main” method is where each object of each class is created and their method would be called and interact further =&gt; the “main” method could reach to the end, but, the program doesn’t since the interaction between the objects created from “main” hasn’ stopped yet (these are called </a:t>
-            </a:r>
-            <a:r>
-              <a:rPr lang="en-GB" sz="1800" b="1" i="1"/>
-              <a:t>“thread”  </a:t>
-            </a:r>
-            <a:r>
-              <a:rPr lang="en-GB" sz="1800"/>
-              <a:t>and many actions happen after the end of “main” or even within the “main” method call are called </a:t>
-            </a:r>
-            <a:r>
-              <a:rPr lang="en-GB" sz="1800" b="1" i="1"/>
-              <a:t>“Multithreading”</a:t>
-            </a:r>
-            <a:r>
-              <a:rPr lang="en-GB" sz="1800"/>
-              <a:t>)</a:t>
-            </a:r>
-          </a:p>
-          <a:p>
-            <a:pPr marL="285750" indent="-285750" algn="l">
-              <a:buFontTx/>
-              <a:buChar char="-"/>
-            </a:pPr>
-            <a:r>
-              <a:rPr lang="en-GB" sz="1800" i="1"/>
-              <a:t>E.g: Java FileIO APIs (file opening and closing even after the “main” method has reached the end” </a:t>
-            </a:r>
-          </a:p>
-          <a:p>
-            <a:pPr marL="285750" indent="-285750" algn="l">
-              <a:buFontTx/>
-              <a:buChar char="-"/>
-            </a:pPr>
             <a:endParaRPr lang="en-GB" sz="1000" i="1"/>
           </a:p>
         </p:txBody>
@@ -8525,16 +9262,1973 @@
           </a:p>
         </p:txBody>
       </p:sp>
+      <p:sp>
+        <p:nvSpPr>
+          <p:cNvPr id="2" name="Subtitle 2">
+            <a:extLst>
+              <a:ext uri="{FF2B5EF4-FFF2-40B4-BE49-F238E27FC236}">
+                <a16:creationId xmlns:a16="http://schemas.microsoft.com/office/drawing/2014/main" id="{F8B4EBA5-D065-6628-05A5-91C8183330F5}"/>
+              </a:ext>
+            </a:extLst>
+          </p:cNvPr>
+          <p:cNvSpPr txBox="1">
+            <a:spLocks/>
+          </p:cNvSpPr>
+          <p:nvPr/>
+        </p:nvSpPr>
+        <p:spPr>
+          <a:xfrm>
+            <a:off x="0" y="820738"/>
+            <a:ext cx="12192000" cy="6037262"/>
+          </a:xfrm>
+          <a:prstGeom prst="rect">
+            <a:avLst/>
+          </a:prstGeom>
+        </p:spPr>
+        <p:txBody>
+          <a:bodyPr vert="horz" lIns="91440" tIns="45720" rIns="91440" bIns="45720" rtlCol="0">
+            <a:normAutofit/>
+          </a:bodyPr>
+          <a:lstStyle>
+            <a:lvl1pPr marL="0" indent="0" algn="ctr" defTabSz="914400" rtl="0" eaLnBrk="1" latinLnBrk="0" hangingPunct="1">
+              <a:lnSpc>
+                <a:spcPct val="90000"/>
+              </a:lnSpc>
+              <a:spcBef>
+                <a:spcPts val="1000"/>
+              </a:spcBef>
+              <a:buFont typeface="Arial" panose="020B0604020202020204" pitchFamily="34" charset="0"/>
+              <a:buNone/>
+              <a:defRPr sz="2400" kern="1200">
+                <a:solidFill>
+                  <a:schemeClr val="tx1"/>
+                </a:solidFill>
+                <a:latin typeface="+mn-lt"/>
+                <a:ea typeface="+mn-ea"/>
+                <a:cs typeface="+mn-cs"/>
+              </a:defRPr>
+            </a:lvl1pPr>
+            <a:lvl2pPr marL="457200" indent="0" algn="ctr" defTabSz="914400" rtl="0" eaLnBrk="1" latinLnBrk="0" hangingPunct="1">
+              <a:lnSpc>
+                <a:spcPct val="90000"/>
+              </a:lnSpc>
+              <a:spcBef>
+                <a:spcPts val="500"/>
+              </a:spcBef>
+              <a:buFont typeface="Arial" panose="020B0604020202020204" pitchFamily="34" charset="0"/>
+              <a:buNone/>
+              <a:defRPr sz="2000" kern="1200">
+                <a:solidFill>
+                  <a:schemeClr val="tx1"/>
+                </a:solidFill>
+                <a:latin typeface="+mn-lt"/>
+                <a:ea typeface="+mn-ea"/>
+                <a:cs typeface="+mn-cs"/>
+              </a:defRPr>
+            </a:lvl2pPr>
+            <a:lvl3pPr marL="914400" indent="0" algn="ctr" defTabSz="914400" rtl="0" eaLnBrk="1" latinLnBrk="0" hangingPunct="1">
+              <a:lnSpc>
+                <a:spcPct val="90000"/>
+              </a:lnSpc>
+              <a:spcBef>
+                <a:spcPts val="500"/>
+              </a:spcBef>
+              <a:buFont typeface="Arial" panose="020B0604020202020204" pitchFamily="34" charset="0"/>
+              <a:buNone/>
+              <a:defRPr sz="1800" kern="1200">
+                <a:solidFill>
+                  <a:schemeClr val="tx1"/>
+                </a:solidFill>
+                <a:latin typeface="+mn-lt"/>
+                <a:ea typeface="+mn-ea"/>
+                <a:cs typeface="+mn-cs"/>
+              </a:defRPr>
+            </a:lvl3pPr>
+            <a:lvl4pPr marL="1371600" indent="0" algn="ctr" defTabSz="914400" rtl="0" eaLnBrk="1" latinLnBrk="0" hangingPunct="1">
+              <a:lnSpc>
+                <a:spcPct val="90000"/>
+              </a:lnSpc>
+              <a:spcBef>
+                <a:spcPts val="500"/>
+              </a:spcBef>
+              <a:buFont typeface="Arial" panose="020B0604020202020204" pitchFamily="34" charset="0"/>
+              <a:buNone/>
+              <a:defRPr sz="1600" kern="1200">
+                <a:solidFill>
+                  <a:schemeClr val="tx1"/>
+                </a:solidFill>
+                <a:latin typeface="+mn-lt"/>
+                <a:ea typeface="+mn-ea"/>
+                <a:cs typeface="+mn-cs"/>
+              </a:defRPr>
+            </a:lvl4pPr>
+            <a:lvl5pPr marL="1828800" indent="0" algn="ctr" defTabSz="914400" rtl="0" eaLnBrk="1" latinLnBrk="0" hangingPunct="1">
+              <a:lnSpc>
+                <a:spcPct val="90000"/>
+              </a:lnSpc>
+              <a:spcBef>
+                <a:spcPts val="500"/>
+              </a:spcBef>
+              <a:buFont typeface="Arial" panose="020B0604020202020204" pitchFamily="34" charset="0"/>
+              <a:buNone/>
+              <a:defRPr sz="1600" kern="1200">
+                <a:solidFill>
+                  <a:schemeClr val="tx1"/>
+                </a:solidFill>
+                <a:latin typeface="+mn-lt"/>
+                <a:ea typeface="+mn-ea"/>
+                <a:cs typeface="+mn-cs"/>
+              </a:defRPr>
+            </a:lvl5pPr>
+            <a:lvl6pPr marL="2286000" indent="0" algn="ctr" defTabSz="914400" rtl="0" eaLnBrk="1" latinLnBrk="0" hangingPunct="1">
+              <a:lnSpc>
+                <a:spcPct val="90000"/>
+              </a:lnSpc>
+              <a:spcBef>
+                <a:spcPts val="500"/>
+              </a:spcBef>
+              <a:buFont typeface="Arial" panose="020B0604020202020204" pitchFamily="34" charset="0"/>
+              <a:buNone/>
+              <a:defRPr sz="1600" kern="1200">
+                <a:solidFill>
+                  <a:schemeClr val="tx1"/>
+                </a:solidFill>
+                <a:latin typeface="+mn-lt"/>
+                <a:ea typeface="+mn-ea"/>
+                <a:cs typeface="+mn-cs"/>
+              </a:defRPr>
+            </a:lvl6pPr>
+            <a:lvl7pPr marL="2743200" indent="0" algn="ctr" defTabSz="914400" rtl="0" eaLnBrk="1" latinLnBrk="0" hangingPunct="1">
+              <a:lnSpc>
+                <a:spcPct val="90000"/>
+              </a:lnSpc>
+              <a:spcBef>
+                <a:spcPts val="500"/>
+              </a:spcBef>
+              <a:buFont typeface="Arial" panose="020B0604020202020204" pitchFamily="34" charset="0"/>
+              <a:buNone/>
+              <a:defRPr sz="1600" kern="1200">
+                <a:solidFill>
+                  <a:schemeClr val="tx1"/>
+                </a:solidFill>
+                <a:latin typeface="+mn-lt"/>
+                <a:ea typeface="+mn-ea"/>
+                <a:cs typeface="+mn-cs"/>
+              </a:defRPr>
+            </a:lvl7pPr>
+            <a:lvl8pPr marL="3200400" indent="0" algn="ctr" defTabSz="914400" rtl="0" eaLnBrk="1" latinLnBrk="0" hangingPunct="1">
+              <a:lnSpc>
+                <a:spcPct val="90000"/>
+              </a:lnSpc>
+              <a:spcBef>
+                <a:spcPts val="500"/>
+              </a:spcBef>
+              <a:buFont typeface="Arial" panose="020B0604020202020204" pitchFamily="34" charset="0"/>
+              <a:buNone/>
+              <a:defRPr sz="1600" kern="1200">
+                <a:solidFill>
+                  <a:schemeClr val="tx1"/>
+                </a:solidFill>
+                <a:latin typeface="+mn-lt"/>
+                <a:ea typeface="+mn-ea"/>
+                <a:cs typeface="+mn-cs"/>
+              </a:defRPr>
+            </a:lvl8pPr>
+            <a:lvl9pPr marL="3657600" indent="0" algn="ctr" defTabSz="914400" rtl="0" eaLnBrk="1" latinLnBrk="0" hangingPunct="1">
+              <a:lnSpc>
+                <a:spcPct val="90000"/>
+              </a:lnSpc>
+              <a:spcBef>
+                <a:spcPts val="500"/>
+              </a:spcBef>
+              <a:buFont typeface="Arial" panose="020B0604020202020204" pitchFamily="34" charset="0"/>
+              <a:buNone/>
+              <a:defRPr sz="1600" kern="1200">
+                <a:solidFill>
+                  <a:schemeClr val="tx1"/>
+                </a:solidFill>
+                <a:latin typeface="+mn-lt"/>
+                <a:ea typeface="+mn-ea"/>
+                <a:cs typeface="+mn-cs"/>
+              </a:defRPr>
+            </a:lvl9pPr>
+          </a:lstStyle>
+          <a:p>
+            <a:pPr marL="285750" indent="-285750" algn="l">
+              <a:buFontTx/>
+              <a:buChar char="-"/>
+            </a:pPr>
+            <a:r>
+              <a:rPr lang="en-GB" b="1" i="1">
+                <a:solidFill>
+                  <a:srgbClr val="FF0000"/>
+                </a:solidFill>
+              </a:rPr>
+              <a:t>A</a:t>
+            </a:r>
+            <a:r>
+              <a:rPr lang="en-GB" sz="1800" b="1" i="1">
+                <a:solidFill>
+                  <a:srgbClr val="FF0000"/>
+                </a:solidFill>
+              </a:rPr>
+              <a:t>bstraction</a:t>
+            </a:r>
+            <a:r>
+              <a:rPr lang="en-GB" sz="1800"/>
+              <a:t>: Abstraction is capturing relevant details of an entity or a concept =&gt; Once a concept is defined, many instances could be created</a:t>
+            </a:r>
+          </a:p>
+          <a:p>
+            <a:pPr marL="285750" indent="-285750" algn="l">
+              <a:buFontTx/>
+              <a:buChar char="-"/>
+            </a:pPr>
+            <a:r>
+              <a:rPr lang="en-GB" b="1" i="1">
+                <a:solidFill>
+                  <a:srgbClr val="FF0000"/>
+                </a:solidFill>
+              </a:rPr>
+              <a:t>P</a:t>
+            </a:r>
+            <a:r>
+              <a:rPr lang="en-GB" sz="1800" b="1" i="1">
+                <a:solidFill>
+                  <a:srgbClr val="FF0000"/>
+                </a:solidFill>
+              </a:rPr>
+              <a:t>olymorphism</a:t>
+            </a:r>
+            <a:r>
+              <a:rPr lang="en-GB" sz="1800"/>
+              <a:t>: Polymorphism means same entity exhibiting different behavior (this is actually direct consequence of inheritance)</a:t>
+            </a:r>
+          </a:p>
+          <a:p>
+            <a:pPr marL="285750" indent="-285750" algn="l">
+              <a:buFontTx/>
+              <a:buChar char="-"/>
+            </a:pPr>
+            <a:r>
+              <a:rPr lang="en-GB" b="1" i="1">
+                <a:solidFill>
+                  <a:srgbClr val="FF0000"/>
+                </a:solidFill>
+              </a:rPr>
+              <a:t>I</a:t>
+            </a:r>
+            <a:r>
+              <a:rPr lang="en-GB" sz="1800" b="1" i="1">
+                <a:solidFill>
+                  <a:srgbClr val="FF0000"/>
+                </a:solidFill>
+              </a:rPr>
+              <a:t>nheritance</a:t>
+            </a:r>
+            <a:r>
+              <a:rPr lang="en-GB" sz="1800"/>
+              <a:t>: Inheritance is process of creating specialized entities by extending existing entities (in other word, inheritance is creating “paternity” between existing and newer objects), this allows new objects or features to be added quickly by reusing the existing attributes and methods of an existing object.</a:t>
+            </a:r>
+          </a:p>
+          <a:p>
+            <a:pPr marL="285750" indent="-285750" algn="l">
+              <a:buFontTx/>
+              <a:buChar char="-"/>
+            </a:pPr>
+            <a:r>
+              <a:rPr lang="en-GB" b="1" i="1">
+                <a:solidFill>
+                  <a:srgbClr val="FF0000"/>
+                </a:solidFill>
+              </a:rPr>
+              <a:t>E</a:t>
+            </a:r>
+            <a:r>
+              <a:rPr lang="en-GB" sz="1800" b="1" i="1">
+                <a:solidFill>
+                  <a:srgbClr val="FF0000"/>
+                </a:solidFill>
+              </a:rPr>
+              <a:t>ncapsulation</a:t>
+            </a:r>
+            <a:r>
+              <a:rPr lang="en-GB" sz="1800"/>
+              <a:t>: Encapsulation is about protecting the properties and the functionality of an object </a:t>
+            </a:r>
+            <a:endParaRPr lang="en-GB" sz="1800" i="1"/>
+          </a:p>
+          <a:p>
+            <a:pPr marL="285750" indent="-285750" algn="l">
+              <a:buFontTx/>
+              <a:buChar char="-"/>
+            </a:pPr>
+            <a:endParaRPr lang="en-GB" sz="1800"/>
+          </a:p>
+        </p:txBody>
+      </p:sp>
     </p:spTree>
     <p:extLst>
       <p:ext uri="{BB962C8B-B14F-4D97-AF65-F5344CB8AC3E}">
-        <p14:creationId xmlns:p14="http://schemas.microsoft.com/office/powerpoint/2010/main" val="1570693514"/>
+        <p14:creationId xmlns:p14="http://schemas.microsoft.com/office/powerpoint/2010/main" val="2598762935"/>
       </p:ext>
     </p:extLst>
   </p:cSld>
   <p:clrMapOvr>
     <a:masterClrMapping/>
   </p:clrMapOvr>
+  <p:timing>
+    <p:tnLst>
+      <p:par>
+        <p:cTn id="1" dur="indefinite" restart="never" nodeType="tmRoot">
+          <p:childTnLst>
+            <p:seq concurrent="1" nextAc="seek">
+              <p:cTn id="2" dur="indefinite" nodeType="mainSeq">
+                <p:childTnLst>
+                  <p:par>
+                    <p:cTn id="3" fill="hold">
+                      <p:stCondLst>
+                        <p:cond delay="indefinite"/>
+                      </p:stCondLst>
+                      <p:childTnLst>
+                        <p:par>
+                          <p:cTn id="4" fill="hold">
+                            <p:stCondLst>
+                              <p:cond delay="0"/>
+                            </p:stCondLst>
+                            <p:childTnLst>
+                              <p:par>
+                                <p:cTn id="5" presetID="1" presetClass="entr" presetSubtype="0" fill="hold" nodeType="clickEffect">
+                                  <p:stCondLst>
+                                    <p:cond delay="0"/>
+                                  </p:stCondLst>
+                                  <p:childTnLst>
+                                    <p:set>
+                                      <p:cBhvr>
+                                        <p:cTn id="6" dur="1" fill="hold">
+                                          <p:stCondLst>
+                                            <p:cond delay="0"/>
+                                          </p:stCondLst>
+                                        </p:cTn>
+                                        <p:tgtEl>
+                                          <p:spTgt spid="2">
+                                            <p:txEl>
+                                              <p:pRg st="0" end="0"/>
+                                            </p:txEl>
+                                          </p:spTgt>
+                                        </p:tgtEl>
+                                        <p:attrNameLst>
+                                          <p:attrName>style.visibility</p:attrName>
+                                        </p:attrNameLst>
+                                      </p:cBhvr>
+                                      <p:to>
+                                        <p:strVal val="visible"/>
+                                      </p:to>
+                                    </p:set>
+                                  </p:childTnLst>
+                                </p:cTn>
+                              </p:par>
+                            </p:childTnLst>
+                          </p:cTn>
+                        </p:par>
+                      </p:childTnLst>
+                    </p:cTn>
+                  </p:par>
+                  <p:par>
+                    <p:cTn id="7" fill="hold">
+                      <p:stCondLst>
+                        <p:cond delay="indefinite"/>
+                      </p:stCondLst>
+                      <p:childTnLst>
+                        <p:par>
+                          <p:cTn id="8" fill="hold">
+                            <p:stCondLst>
+                              <p:cond delay="0"/>
+                            </p:stCondLst>
+                            <p:childTnLst>
+                              <p:par>
+                                <p:cTn id="9" presetID="1" presetClass="entr" presetSubtype="0" fill="hold" nodeType="clickEffect">
+                                  <p:stCondLst>
+                                    <p:cond delay="0"/>
+                                  </p:stCondLst>
+                                  <p:childTnLst>
+                                    <p:set>
+                                      <p:cBhvr>
+                                        <p:cTn id="10" dur="1" fill="hold">
+                                          <p:stCondLst>
+                                            <p:cond delay="0"/>
+                                          </p:stCondLst>
+                                        </p:cTn>
+                                        <p:tgtEl>
+                                          <p:spTgt spid="2">
+                                            <p:txEl>
+                                              <p:pRg st="3" end="3"/>
+                                            </p:txEl>
+                                          </p:spTgt>
+                                        </p:tgtEl>
+                                        <p:attrNameLst>
+                                          <p:attrName>style.visibility</p:attrName>
+                                        </p:attrNameLst>
+                                      </p:cBhvr>
+                                      <p:to>
+                                        <p:strVal val="visible"/>
+                                      </p:to>
+                                    </p:set>
+                                  </p:childTnLst>
+                                </p:cTn>
+                              </p:par>
+                            </p:childTnLst>
+                          </p:cTn>
+                        </p:par>
+                      </p:childTnLst>
+                    </p:cTn>
+                  </p:par>
+                  <p:par>
+                    <p:cTn id="11" fill="hold">
+                      <p:stCondLst>
+                        <p:cond delay="indefinite"/>
+                      </p:stCondLst>
+                      <p:childTnLst>
+                        <p:par>
+                          <p:cTn id="12" fill="hold">
+                            <p:stCondLst>
+                              <p:cond delay="0"/>
+                            </p:stCondLst>
+                            <p:childTnLst>
+                              <p:par>
+                                <p:cTn id="13" presetID="1" presetClass="entr" presetSubtype="0" fill="hold" nodeType="clickEffect">
+                                  <p:stCondLst>
+                                    <p:cond delay="0"/>
+                                  </p:stCondLst>
+                                  <p:childTnLst>
+                                    <p:set>
+                                      <p:cBhvr>
+                                        <p:cTn id="14" dur="1" fill="hold">
+                                          <p:stCondLst>
+                                            <p:cond delay="0"/>
+                                          </p:stCondLst>
+                                        </p:cTn>
+                                        <p:tgtEl>
+                                          <p:spTgt spid="2">
+                                            <p:txEl>
+                                              <p:pRg st="2" end="2"/>
+                                            </p:txEl>
+                                          </p:spTgt>
+                                        </p:tgtEl>
+                                        <p:attrNameLst>
+                                          <p:attrName>style.visibility</p:attrName>
+                                        </p:attrNameLst>
+                                      </p:cBhvr>
+                                      <p:to>
+                                        <p:strVal val="visible"/>
+                                      </p:to>
+                                    </p:set>
+                                  </p:childTnLst>
+                                </p:cTn>
+                              </p:par>
+                            </p:childTnLst>
+                          </p:cTn>
+                        </p:par>
+                      </p:childTnLst>
+                    </p:cTn>
+                  </p:par>
+                  <p:par>
+                    <p:cTn id="15" fill="hold">
+                      <p:stCondLst>
+                        <p:cond delay="indefinite"/>
+                      </p:stCondLst>
+                      <p:childTnLst>
+                        <p:par>
+                          <p:cTn id="16" fill="hold">
+                            <p:stCondLst>
+                              <p:cond delay="0"/>
+                            </p:stCondLst>
+                            <p:childTnLst>
+                              <p:par>
+                                <p:cTn id="17" presetID="1" presetClass="entr" presetSubtype="0" fill="hold" nodeType="clickEffect">
+                                  <p:stCondLst>
+                                    <p:cond delay="0"/>
+                                  </p:stCondLst>
+                                  <p:childTnLst>
+                                    <p:set>
+                                      <p:cBhvr>
+                                        <p:cTn id="18" dur="1" fill="hold">
+                                          <p:stCondLst>
+                                            <p:cond delay="0"/>
+                                          </p:stCondLst>
+                                        </p:cTn>
+                                        <p:tgtEl>
+                                          <p:spTgt spid="2">
+                                            <p:txEl>
+                                              <p:pRg st="1" end="1"/>
+                                            </p:txEl>
+                                          </p:spTgt>
+                                        </p:tgtEl>
+                                        <p:attrNameLst>
+                                          <p:attrName>style.visibility</p:attrName>
+                                        </p:attrNameLst>
+                                      </p:cBhvr>
+                                      <p:to>
+                                        <p:strVal val="visible"/>
+                                      </p:to>
+                                    </p:set>
+                                  </p:childTnLst>
+                                </p:cTn>
+                              </p:par>
+                            </p:childTnLst>
+                          </p:cTn>
+                        </p:par>
+                      </p:childTnLst>
+                    </p:cTn>
+                  </p:par>
+                </p:childTnLst>
+              </p:cTn>
+              <p:prevCondLst>
+                <p:cond evt="onPrev" delay="0">
+                  <p:tgtEl>
+                    <p:sldTgt/>
+                  </p:tgtEl>
+                </p:cond>
+              </p:prevCondLst>
+              <p:nextCondLst>
+                <p:cond evt="onNext" delay="0">
+                  <p:tgtEl>
+                    <p:sldTgt/>
+                  </p:tgtEl>
+                </p:cond>
+              </p:nextCondLst>
+            </p:seq>
+          </p:childTnLst>
+        </p:cTn>
+      </p:par>
+    </p:tnLst>
+  </p:timing>
+</p:sld>
+</file>
+
+<file path=ppt/slides/slide9.xml><?xml version="1.0" encoding="utf-8"?>
+<p:sld xmlns:a="http://schemas.openxmlformats.org/drawingml/2006/main" xmlns:r="http://schemas.openxmlformats.org/officeDocument/2006/relationships" xmlns:p="http://schemas.openxmlformats.org/presentationml/2006/main">
+  <p:cSld>
+    <p:spTree>
+      <p:nvGrpSpPr>
+        <p:cNvPr id="1" name=""/>
+        <p:cNvGrpSpPr/>
+        <p:nvPr/>
+      </p:nvGrpSpPr>
+      <p:grpSpPr>
+        <a:xfrm>
+          <a:off x="0" y="0"/>
+          <a:ext cx="0" cy="0"/>
+          <a:chOff x="0" y="0"/>
+          <a:chExt cx="0" cy="0"/>
+        </a:xfrm>
+      </p:grpSpPr>
+      <p:sp>
+        <p:nvSpPr>
+          <p:cNvPr id="3" name="Subtitle 2">
+            <a:extLst>
+              <a:ext uri="{FF2B5EF4-FFF2-40B4-BE49-F238E27FC236}">
+                <a16:creationId xmlns:a16="http://schemas.microsoft.com/office/drawing/2014/main" id="{96DD8BC4-D539-661E-8A88-53AF6C208F93}"/>
+              </a:ext>
+            </a:extLst>
+          </p:cNvPr>
+          <p:cNvSpPr>
+            <a:spLocks noGrp="1"/>
+          </p:cNvSpPr>
+          <p:nvPr>
+            <p:ph type="subTitle" idx="1"/>
+          </p:nvPr>
+        </p:nvSpPr>
+        <p:spPr>
+          <a:xfrm>
+            <a:off x="152400" y="217488"/>
+            <a:ext cx="6686550" cy="303212"/>
+          </a:xfrm>
+        </p:spPr>
+        <p:txBody>
+          <a:bodyPr>
+            <a:normAutofit fontScale="92500" lnSpcReduction="20000"/>
+          </a:bodyPr>
+          <a:lstStyle/>
+          <a:p>
+            <a:r>
+              <a:rPr lang="en-US" sz="1800"/>
+              <a:t>3.6 Object-Oriented Programming: </a:t>
+            </a:r>
+            <a:r>
+              <a:rPr lang="en-US" sz="1800" b="1" i="1"/>
+              <a:t>3.6.4 – OOP in Java</a:t>
+            </a:r>
+          </a:p>
+        </p:txBody>
+      </p:sp>
+      <p:sp>
+        <p:nvSpPr>
+          <p:cNvPr id="4" name="Subtitle 2">
+            <a:extLst>
+              <a:ext uri="{FF2B5EF4-FFF2-40B4-BE49-F238E27FC236}">
+                <a16:creationId xmlns:a16="http://schemas.microsoft.com/office/drawing/2014/main" id="{BBA13038-CAB8-FCA0-CDE8-65E40C2F10A3}"/>
+              </a:ext>
+            </a:extLst>
+          </p:cNvPr>
+          <p:cNvSpPr txBox="1">
+            <a:spLocks/>
+          </p:cNvSpPr>
+          <p:nvPr/>
+        </p:nvSpPr>
+        <p:spPr>
+          <a:xfrm>
+            <a:off x="0" y="820738"/>
+            <a:ext cx="12192000" cy="6037262"/>
+          </a:xfrm>
+          <a:prstGeom prst="rect">
+            <a:avLst/>
+          </a:prstGeom>
+        </p:spPr>
+        <p:txBody>
+          <a:bodyPr vert="horz" lIns="91440" tIns="45720" rIns="91440" bIns="45720" rtlCol="0">
+            <a:normAutofit/>
+          </a:bodyPr>
+          <a:lstStyle>
+            <a:lvl1pPr marL="0" indent="0" algn="ctr" defTabSz="914400" rtl="0" eaLnBrk="1" latinLnBrk="0" hangingPunct="1">
+              <a:lnSpc>
+                <a:spcPct val="90000"/>
+              </a:lnSpc>
+              <a:spcBef>
+                <a:spcPts val="1000"/>
+              </a:spcBef>
+              <a:buFont typeface="Arial" panose="020B0604020202020204" pitchFamily="34" charset="0"/>
+              <a:buNone/>
+              <a:defRPr sz="2400" kern="1200">
+                <a:solidFill>
+                  <a:schemeClr val="tx1"/>
+                </a:solidFill>
+                <a:latin typeface="+mn-lt"/>
+                <a:ea typeface="+mn-ea"/>
+                <a:cs typeface="+mn-cs"/>
+              </a:defRPr>
+            </a:lvl1pPr>
+            <a:lvl2pPr marL="457200" indent="0" algn="ctr" defTabSz="914400" rtl="0" eaLnBrk="1" latinLnBrk="0" hangingPunct="1">
+              <a:lnSpc>
+                <a:spcPct val="90000"/>
+              </a:lnSpc>
+              <a:spcBef>
+                <a:spcPts val="500"/>
+              </a:spcBef>
+              <a:buFont typeface="Arial" panose="020B0604020202020204" pitchFamily="34" charset="0"/>
+              <a:buNone/>
+              <a:defRPr sz="2000" kern="1200">
+                <a:solidFill>
+                  <a:schemeClr val="tx1"/>
+                </a:solidFill>
+                <a:latin typeface="+mn-lt"/>
+                <a:ea typeface="+mn-ea"/>
+                <a:cs typeface="+mn-cs"/>
+              </a:defRPr>
+            </a:lvl2pPr>
+            <a:lvl3pPr marL="914400" indent="0" algn="ctr" defTabSz="914400" rtl="0" eaLnBrk="1" latinLnBrk="0" hangingPunct="1">
+              <a:lnSpc>
+                <a:spcPct val="90000"/>
+              </a:lnSpc>
+              <a:spcBef>
+                <a:spcPts val="500"/>
+              </a:spcBef>
+              <a:buFont typeface="Arial" panose="020B0604020202020204" pitchFamily="34" charset="0"/>
+              <a:buNone/>
+              <a:defRPr sz="1800" kern="1200">
+                <a:solidFill>
+                  <a:schemeClr val="tx1"/>
+                </a:solidFill>
+                <a:latin typeface="+mn-lt"/>
+                <a:ea typeface="+mn-ea"/>
+                <a:cs typeface="+mn-cs"/>
+              </a:defRPr>
+            </a:lvl3pPr>
+            <a:lvl4pPr marL="1371600" indent="0" algn="ctr" defTabSz="914400" rtl="0" eaLnBrk="1" latinLnBrk="0" hangingPunct="1">
+              <a:lnSpc>
+                <a:spcPct val="90000"/>
+              </a:lnSpc>
+              <a:spcBef>
+                <a:spcPts val="500"/>
+              </a:spcBef>
+              <a:buFont typeface="Arial" panose="020B0604020202020204" pitchFamily="34" charset="0"/>
+              <a:buNone/>
+              <a:defRPr sz="1600" kern="1200">
+                <a:solidFill>
+                  <a:schemeClr val="tx1"/>
+                </a:solidFill>
+                <a:latin typeface="+mn-lt"/>
+                <a:ea typeface="+mn-ea"/>
+                <a:cs typeface="+mn-cs"/>
+              </a:defRPr>
+            </a:lvl4pPr>
+            <a:lvl5pPr marL="1828800" indent="0" algn="ctr" defTabSz="914400" rtl="0" eaLnBrk="1" latinLnBrk="0" hangingPunct="1">
+              <a:lnSpc>
+                <a:spcPct val="90000"/>
+              </a:lnSpc>
+              <a:spcBef>
+                <a:spcPts val="500"/>
+              </a:spcBef>
+              <a:buFont typeface="Arial" panose="020B0604020202020204" pitchFamily="34" charset="0"/>
+              <a:buNone/>
+              <a:defRPr sz="1600" kern="1200">
+                <a:solidFill>
+                  <a:schemeClr val="tx1"/>
+                </a:solidFill>
+                <a:latin typeface="+mn-lt"/>
+                <a:ea typeface="+mn-ea"/>
+                <a:cs typeface="+mn-cs"/>
+              </a:defRPr>
+            </a:lvl5pPr>
+            <a:lvl6pPr marL="2286000" indent="0" algn="ctr" defTabSz="914400" rtl="0" eaLnBrk="1" latinLnBrk="0" hangingPunct="1">
+              <a:lnSpc>
+                <a:spcPct val="90000"/>
+              </a:lnSpc>
+              <a:spcBef>
+                <a:spcPts val="500"/>
+              </a:spcBef>
+              <a:buFont typeface="Arial" panose="020B0604020202020204" pitchFamily="34" charset="0"/>
+              <a:buNone/>
+              <a:defRPr sz="1600" kern="1200">
+                <a:solidFill>
+                  <a:schemeClr val="tx1"/>
+                </a:solidFill>
+                <a:latin typeface="+mn-lt"/>
+                <a:ea typeface="+mn-ea"/>
+                <a:cs typeface="+mn-cs"/>
+              </a:defRPr>
+            </a:lvl6pPr>
+            <a:lvl7pPr marL="2743200" indent="0" algn="ctr" defTabSz="914400" rtl="0" eaLnBrk="1" latinLnBrk="0" hangingPunct="1">
+              <a:lnSpc>
+                <a:spcPct val="90000"/>
+              </a:lnSpc>
+              <a:spcBef>
+                <a:spcPts val="500"/>
+              </a:spcBef>
+              <a:buFont typeface="Arial" panose="020B0604020202020204" pitchFamily="34" charset="0"/>
+              <a:buNone/>
+              <a:defRPr sz="1600" kern="1200">
+                <a:solidFill>
+                  <a:schemeClr val="tx1"/>
+                </a:solidFill>
+                <a:latin typeface="+mn-lt"/>
+                <a:ea typeface="+mn-ea"/>
+                <a:cs typeface="+mn-cs"/>
+              </a:defRPr>
+            </a:lvl7pPr>
+            <a:lvl8pPr marL="3200400" indent="0" algn="ctr" defTabSz="914400" rtl="0" eaLnBrk="1" latinLnBrk="0" hangingPunct="1">
+              <a:lnSpc>
+                <a:spcPct val="90000"/>
+              </a:lnSpc>
+              <a:spcBef>
+                <a:spcPts val="500"/>
+              </a:spcBef>
+              <a:buFont typeface="Arial" panose="020B0604020202020204" pitchFamily="34" charset="0"/>
+              <a:buNone/>
+              <a:defRPr sz="1600" kern="1200">
+                <a:solidFill>
+                  <a:schemeClr val="tx1"/>
+                </a:solidFill>
+                <a:latin typeface="+mn-lt"/>
+                <a:ea typeface="+mn-ea"/>
+                <a:cs typeface="+mn-cs"/>
+              </a:defRPr>
+            </a:lvl8pPr>
+            <a:lvl9pPr marL="3657600" indent="0" algn="ctr" defTabSz="914400" rtl="0" eaLnBrk="1" latinLnBrk="0" hangingPunct="1">
+              <a:lnSpc>
+                <a:spcPct val="90000"/>
+              </a:lnSpc>
+              <a:spcBef>
+                <a:spcPts val="500"/>
+              </a:spcBef>
+              <a:buFont typeface="Arial" panose="020B0604020202020204" pitchFamily="34" charset="0"/>
+              <a:buNone/>
+              <a:defRPr sz="1600" kern="1200">
+                <a:solidFill>
+                  <a:schemeClr val="tx1"/>
+                </a:solidFill>
+                <a:latin typeface="+mn-lt"/>
+                <a:ea typeface="+mn-ea"/>
+                <a:cs typeface="+mn-cs"/>
+              </a:defRPr>
+            </a:lvl9pPr>
+          </a:lstStyle>
+          <a:p>
+            <a:pPr marL="285750" indent="-285750" algn="l">
+              <a:buFontTx/>
+              <a:buChar char="-"/>
+            </a:pPr>
+            <a:endParaRPr lang="en-GB" sz="1000" i="1"/>
+          </a:p>
+        </p:txBody>
+      </p:sp>
+      <p:sp>
+        <p:nvSpPr>
+          <p:cNvPr id="5" name="Subtitle 2">
+            <a:extLst>
+              <a:ext uri="{FF2B5EF4-FFF2-40B4-BE49-F238E27FC236}">
+                <a16:creationId xmlns:a16="http://schemas.microsoft.com/office/drawing/2014/main" id="{BBA13038-CAB8-FCA0-CDE8-65E40C2F10A3}"/>
+              </a:ext>
+            </a:extLst>
+          </p:cNvPr>
+          <p:cNvSpPr txBox="1">
+            <a:spLocks/>
+          </p:cNvSpPr>
+          <p:nvPr/>
+        </p:nvSpPr>
+        <p:spPr>
+          <a:xfrm>
+            <a:off x="1835150" y="3429000"/>
+            <a:ext cx="9137650" cy="2400657"/>
+          </a:xfrm>
+          <a:prstGeom prst="rect">
+            <a:avLst/>
+          </a:prstGeom>
+        </p:spPr>
+        <p:txBody>
+          <a:bodyPr vert="horz" lIns="91440" tIns="45720" rIns="91440" bIns="45720" rtlCol="0">
+            <a:normAutofit/>
+          </a:bodyPr>
+          <a:lstStyle>
+            <a:lvl1pPr marL="0" indent="0" algn="ctr" defTabSz="914400" rtl="0" eaLnBrk="1" latinLnBrk="0" hangingPunct="1">
+              <a:lnSpc>
+                <a:spcPct val="90000"/>
+              </a:lnSpc>
+              <a:spcBef>
+                <a:spcPts val="1000"/>
+              </a:spcBef>
+              <a:buFont typeface="Arial" panose="020B0604020202020204" pitchFamily="34" charset="0"/>
+              <a:buNone/>
+              <a:defRPr sz="2400" kern="1200">
+                <a:solidFill>
+                  <a:schemeClr val="tx1"/>
+                </a:solidFill>
+                <a:latin typeface="+mn-lt"/>
+                <a:ea typeface="+mn-ea"/>
+                <a:cs typeface="+mn-cs"/>
+              </a:defRPr>
+            </a:lvl1pPr>
+            <a:lvl2pPr marL="457200" indent="0" algn="ctr" defTabSz="914400" rtl="0" eaLnBrk="1" latinLnBrk="0" hangingPunct="1">
+              <a:lnSpc>
+                <a:spcPct val="90000"/>
+              </a:lnSpc>
+              <a:spcBef>
+                <a:spcPts val="500"/>
+              </a:spcBef>
+              <a:buFont typeface="Arial" panose="020B0604020202020204" pitchFamily="34" charset="0"/>
+              <a:buNone/>
+              <a:defRPr sz="2000" kern="1200">
+                <a:solidFill>
+                  <a:schemeClr val="tx1"/>
+                </a:solidFill>
+                <a:latin typeface="+mn-lt"/>
+                <a:ea typeface="+mn-ea"/>
+                <a:cs typeface="+mn-cs"/>
+              </a:defRPr>
+            </a:lvl2pPr>
+            <a:lvl3pPr marL="914400" indent="0" algn="ctr" defTabSz="914400" rtl="0" eaLnBrk="1" latinLnBrk="0" hangingPunct="1">
+              <a:lnSpc>
+                <a:spcPct val="90000"/>
+              </a:lnSpc>
+              <a:spcBef>
+                <a:spcPts val="500"/>
+              </a:spcBef>
+              <a:buFont typeface="Arial" panose="020B0604020202020204" pitchFamily="34" charset="0"/>
+              <a:buNone/>
+              <a:defRPr sz="1800" kern="1200">
+                <a:solidFill>
+                  <a:schemeClr val="tx1"/>
+                </a:solidFill>
+                <a:latin typeface="+mn-lt"/>
+                <a:ea typeface="+mn-ea"/>
+                <a:cs typeface="+mn-cs"/>
+              </a:defRPr>
+            </a:lvl3pPr>
+            <a:lvl4pPr marL="1371600" indent="0" algn="ctr" defTabSz="914400" rtl="0" eaLnBrk="1" latinLnBrk="0" hangingPunct="1">
+              <a:lnSpc>
+                <a:spcPct val="90000"/>
+              </a:lnSpc>
+              <a:spcBef>
+                <a:spcPts val="500"/>
+              </a:spcBef>
+              <a:buFont typeface="Arial" panose="020B0604020202020204" pitchFamily="34" charset="0"/>
+              <a:buNone/>
+              <a:defRPr sz="1600" kern="1200">
+                <a:solidFill>
+                  <a:schemeClr val="tx1"/>
+                </a:solidFill>
+                <a:latin typeface="+mn-lt"/>
+                <a:ea typeface="+mn-ea"/>
+                <a:cs typeface="+mn-cs"/>
+              </a:defRPr>
+            </a:lvl4pPr>
+            <a:lvl5pPr marL="1828800" indent="0" algn="ctr" defTabSz="914400" rtl="0" eaLnBrk="1" latinLnBrk="0" hangingPunct="1">
+              <a:lnSpc>
+                <a:spcPct val="90000"/>
+              </a:lnSpc>
+              <a:spcBef>
+                <a:spcPts val="500"/>
+              </a:spcBef>
+              <a:buFont typeface="Arial" panose="020B0604020202020204" pitchFamily="34" charset="0"/>
+              <a:buNone/>
+              <a:defRPr sz="1600" kern="1200">
+                <a:solidFill>
+                  <a:schemeClr val="tx1"/>
+                </a:solidFill>
+                <a:latin typeface="+mn-lt"/>
+                <a:ea typeface="+mn-ea"/>
+                <a:cs typeface="+mn-cs"/>
+              </a:defRPr>
+            </a:lvl5pPr>
+            <a:lvl6pPr marL="2286000" indent="0" algn="ctr" defTabSz="914400" rtl="0" eaLnBrk="1" latinLnBrk="0" hangingPunct="1">
+              <a:lnSpc>
+                <a:spcPct val="90000"/>
+              </a:lnSpc>
+              <a:spcBef>
+                <a:spcPts val="500"/>
+              </a:spcBef>
+              <a:buFont typeface="Arial" panose="020B0604020202020204" pitchFamily="34" charset="0"/>
+              <a:buNone/>
+              <a:defRPr sz="1600" kern="1200">
+                <a:solidFill>
+                  <a:schemeClr val="tx1"/>
+                </a:solidFill>
+                <a:latin typeface="+mn-lt"/>
+                <a:ea typeface="+mn-ea"/>
+                <a:cs typeface="+mn-cs"/>
+              </a:defRPr>
+            </a:lvl6pPr>
+            <a:lvl7pPr marL="2743200" indent="0" algn="ctr" defTabSz="914400" rtl="0" eaLnBrk="1" latinLnBrk="0" hangingPunct="1">
+              <a:lnSpc>
+                <a:spcPct val="90000"/>
+              </a:lnSpc>
+              <a:spcBef>
+                <a:spcPts val="500"/>
+              </a:spcBef>
+              <a:buFont typeface="Arial" panose="020B0604020202020204" pitchFamily="34" charset="0"/>
+              <a:buNone/>
+              <a:defRPr sz="1600" kern="1200">
+                <a:solidFill>
+                  <a:schemeClr val="tx1"/>
+                </a:solidFill>
+                <a:latin typeface="+mn-lt"/>
+                <a:ea typeface="+mn-ea"/>
+                <a:cs typeface="+mn-cs"/>
+              </a:defRPr>
+            </a:lvl7pPr>
+            <a:lvl8pPr marL="3200400" indent="0" algn="ctr" defTabSz="914400" rtl="0" eaLnBrk="1" latinLnBrk="0" hangingPunct="1">
+              <a:lnSpc>
+                <a:spcPct val="90000"/>
+              </a:lnSpc>
+              <a:spcBef>
+                <a:spcPts val="500"/>
+              </a:spcBef>
+              <a:buFont typeface="Arial" panose="020B0604020202020204" pitchFamily="34" charset="0"/>
+              <a:buNone/>
+              <a:defRPr sz="1600" kern="1200">
+                <a:solidFill>
+                  <a:schemeClr val="tx1"/>
+                </a:solidFill>
+                <a:latin typeface="+mn-lt"/>
+                <a:ea typeface="+mn-ea"/>
+                <a:cs typeface="+mn-cs"/>
+              </a:defRPr>
+            </a:lvl8pPr>
+            <a:lvl9pPr marL="3657600" indent="0" algn="ctr" defTabSz="914400" rtl="0" eaLnBrk="1" latinLnBrk="0" hangingPunct="1">
+              <a:lnSpc>
+                <a:spcPct val="90000"/>
+              </a:lnSpc>
+              <a:spcBef>
+                <a:spcPts val="500"/>
+              </a:spcBef>
+              <a:buFont typeface="Arial" panose="020B0604020202020204" pitchFamily="34" charset="0"/>
+              <a:buNone/>
+              <a:defRPr sz="1600" kern="1200">
+                <a:solidFill>
+                  <a:schemeClr val="tx1"/>
+                </a:solidFill>
+                <a:latin typeface="+mn-lt"/>
+                <a:ea typeface="+mn-ea"/>
+                <a:cs typeface="+mn-cs"/>
+              </a:defRPr>
+            </a:lvl9pPr>
+          </a:lstStyle>
+          <a:p>
+            <a:pPr marL="285750" indent="-285750" algn="l">
+              <a:buFontTx/>
+              <a:buChar char="-"/>
+            </a:pPr>
+            <a:endParaRPr lang="en-GB" sz="1000" i="1"/>
+          </a:p>
+        </p:txBody>
+      </p:sp>
+      <p:sp>
+        <p:nvSpPr>
+          <p:cNvPr id="7" name="Subtitle 2">
+            <a:extLst>
+              <a:ext uri="{FF2B5EF4-FFF2-40B4-BE49-F238E27FC236}">
+                <a16:creationId xmlns:a16="http://schemas.microsoft.com/office/drawing/2014/main" id="{735C0034-9699-F9D9-6534-306539359175}"/>
+              </a:ext>
+            </a:extLst>
+          </p:cNvPr>
+          <p:cNvSpPr txBox="1">
+            <a:spLocks/>
+          </p:cNvSpPr>
+          <p:nvPr/>
+        </p:nvSpPr>
+        <p:spPr>
+          <a:xfrm>
+            <a:off x="0" y="2028102"/>
+            <a:ext cx="12192000" cy="4829898"/>
+          </a:xfrm>
+          <a:prstGeom prst="rect">
+            <a:avLst/>
+          </a:prstGeom>
+        </p:spPr>
+        <p:txBody>
+          <a:bodyPr vert="horz" lIns="91440" tIns="45720" rIns="91440" bIns="45720" rtlCol="0">
+            <a:normAutofit/>
+          </a:bodyPr>
+          <a:lstStyle>
+            <a:lvl1pPr marL="0" indent="0" algn="ctr" defTabSz="914400" rtl="0" eaLnBrk="1" latinLnBrk="0" hangingPunct="1">
+              <a:lnSpc>
+                <a:spcPct val="90000"/>
+              </a:lnSpc>
+              <a:spcBef>
+                <a:spcPts val="1000"/>
+              </a:spcBef>
+              <a:buFont typeface="Arial" panose="020B0604020202020204" pitchFamily="34" charset="0"/>
+              <a:buNone/>
+              <a:defRPr sz="2400" kern="1200">
+                <a:solidFill>
+                  <a:schemeClr val="tx1"/>
+                </a:solidFill>
+                <a:latin typeface="+mn-lt"/>
+                <a:ea typeface="+mn-ea"/>
+                <a:cs typeface="+mn-cs"/>
+              </a:defRPr>
+            </a:lvl1pPr>
+            <a:lvl2pPr marL="457200" indent="0" algn="ctr" defTabSz="914400" rtl="0" eaLnBrk="1" latinLnBrk="0" hangingPunct="1">
+              <a:lnSpc>
+                <a:spcPct val="90000"/>
+              </a:lnSpc>
+              <a:spcBef>
+                <a:spcPts val="500"/>
+              </a:spcBef>
+              <a:buFont typeface="Arial" panose="020B0604020202020204" pitchFamily="34" charset="0"/>
+              <a:buNone/>
+              <a:defRPr sz="2000" kern="1200">
+                <a:solidFill>
+                  <a:schemeClr val="tx1"/>
+                </a:solidFill>
+                <a:latin typeface="+mn-lt"/>
+                <a:ea typeface="+mn-ea"/>
+                <a:cs typeface="+mn-cs"/>
+              </a:defRPr>
+            </a:lvl2pPr>
+            <a:lvl3pPr marL="914400" indent="0" algn="ctr" defTabSz="914400" rtl="0" eaLnBrk="1" latinLnBrk="0" hangingPunct="1">
+              <a:lnSpc>
+                <a:spcPct val="90000"/>
+              </a:lnSpc>
+              <a:spcBef>
+                <a:spcPts val="500"/>
+              </a:spcBef>
+              <a:buFont typeface="Arial" panose="020B0604020202020204" pitchFamily="34" charset="0"/>
+              <a:buNone/>
+              <a:defRPr sz="1800" kern="1200">
+                <a:solidFill>
+                  <a:schemeClr val="tx1"/>
+                </a:solidFill>
+                <a:latin typeface="+mn-lt"/>
+                <a:ea typeface="+mn-ea"/>
+                <a:cs typeface="+mn-cs"/>
+              </a:defRPr>
+            </a:lvl3pPr>
+            <a:lvl4pPr marL="1371600" indent="0" algn="ctr" defTabSz="914400" rtl="0" eaLnBrk="1" latinLnBrk="0" hangingPunct="1">
+              <a:lnSpc>
+                <a:spcPct val="90000"/>
+              </a:lnSpc>
+              <a:spcBef>
+                <a:spcPts val="500"/>
+              </a:spcBef>
+              <a:buFont typeface="Arial" panose="020B0604020202020204" pitchFamily="34" charset="0"/>
+              <a:buNone/>
+              <a:defRPr sz="1600" kern="1200">
+                <a:solidFill>
+                  <a:schemeClr val="tx1"/>
+                </a:solidFill>
+                <a:latin typeface="+mn-lt"/>
+                <a:ea typeface="+mn-ea"/>
+                <a:cs typeface="+mn-cs"/>
+              </a:defRPr>
+            </a:lvl4pPr>
+            <a:lvl5pPr marL="1828800" indent="0" algn="ctr" defTabSz="914400" rtl="0" eaLnBrk="1" latinLnBrk="0" hangingPunct="1">
+              <a:lnSpc>
+                <a:spcPct val="90000"/>
+              </a:lnSpc>
+              <a:spcBef>
+                <a:spcPts val="500"/>
+              </a:spcBef>
+              <a:buFont typeface="Arial" panose="020B0604020202020204" pitchFamily="34" charset="0"/>
+              <a:buNone/>
+              <a:defRPr sz="1600" kern="1200">
+                <a:solidFill>
+                  <a:schemeClr val="tx1"/>
+                </a:solidFill>
+                <a:latin typeface="+mn-lt"/>
+                <a:ea typeface="+mn-ea"/>
+                <a:cs typeface="+mn-cs"/>
+              </a:defRPr>
+            </a:lvl5pPr>
+            <a:lvl6pPr marL="2286000" indent="0" algn="ctr" defTabSz="914400" rtl="0" eaLnBrk="1" latinLnBrk="0" hangingPunct="1">
+              <a:lnSpc>
+                <a:spcPct val="90000"/>
+              </a:lnSpc>
+              <a:spcBef>
+                <a:spcPts val="500"/>
+              </a:spcBef>
+              <a:buFont typeface="Arial" panose="020B0604020202020204" pitchFamily="34" charset="0"/>
+              <a:buNone/>
+              <a:defRPr sz="1600" kern="1200">
+                <a:solidFill>
+                  <a:schemeClr val="tx1"/>
+                </a:solidFill>
+                <a:latin typeface="+mn-lt"/>
+                <a:ea typeface="+mn-ea"/>
+                <a:cs typeface="+mn-cs"/>
+              </a:defRPr>
+            </a:lvl6pPr>
+            <a:lvl7pPr marL="2743200" indent="0" algn="ctr" defTabSz="914400" rtl="0" eaLnBrk="1" latinLnBrk="0" hangingPunct="1">
+              <a:lnSpc>
+                <a:spcPct val="90000"/>
+              </a:lnSpc>
+              <a:spcBef>
+                <a:spcPts val="500"/>
+              </a:spcBef>
+              <a:buFont typeface="Arial" panose="020B0604020202020204" pitchFamily="34" charset="0"/>
+              <a:buNone/>
+              <a:defRPr sz="1600" kern="1200">
+                <a:solidFill>
+                  <a:schemeClr val="tx1"/>
+                </a:solidFill>
+                <a:latin typeface="+mn-lt"/>
+                <a:ea typeface="+mn-ea"/>
+                <a:cs typeface="+mn-cs"/>
+              </a:defRPr>
+            </a:lvl7pPr>
+            <a:lvl8pPr marL="3200400" indent="0" algn="ctr" defTabSz="914400" rtl="0" eaLnBrk="1" latinLnBrk="0" hangingPunct="1">
+              <a:lnSpc>
+                <a:spcPct val="90000"/>
+              </a:lnSpc>
+              <a:spcBef>
+                <a:spcPts val="500"/>
+              </a:spcBef>
+              <a:buFont typeface="Arial" panose="020B0604020202020204" pitchFamily="34" charset="0"/>
+              <a:buNone/>
+              <a:defRPr sz="1600" kern="1200">
+                <a:solidFill>
+                  <a:schemeClr val="tx1"/>
+                </a:solidFill>
+                <a:latin typeface="+mn-lt"/>
+                <a:ea typeface="+mn-ea"/>
+                <a:cs typeface="+mn-cs"/>
+              </a:defRPr>
+            </a:lvl8pPr>
+            <a:lvl9pPr marL="3657600" indent="0" algn="ctr" defTabSz="914400" rtl="0" eaLnBrk="1" latinLnBrk="0" hangingPunct="1">
+              <a:lnSpc>
+                <a:spcPct val="90000"/>
+              </a:lnSpc>
+              <a:spcBef>
+                <a:spcPts val="500"/>
+              </a:spcBef>
+              <a:buFont typeface="Arial" panose="020B0604020202020204" pitchFamily="34" charset="0"/>
+              <a:buNone/>
+              <a:defRPr sz="1600" kern="1200">
+                <a:solidFill>
+                  <a:schemeClr val="tx1"/>
+                </a:solidFill>
+                <a:latin typeface="+mn-lt"/>
+                <a:ea typeface="+mn-ea"/>
+                <a:cs typeface="+mn-cs"/>
+              </a:defRPr>
+            </a:lvl9pPr>
+          </a:lstStyle>
+          <a:p>
+            <a:pPr marL="285750" indent="-285750" algn="l">
+              <a:buFontTx/>
+              <a:buChar char="-"/>
+            </a:pPr>
+            <a:endParaRPr lang="en-GB" sz="1800"/>
+          </a:p>
+          <a:p>
+            <a:pPr marL="285750" indent="-285750" algn="l">
+              <a:buFontTx/>
+              <a:buChar char="-"/>
+            </a:pPr>
+            <a:endParaRPr lang="en-GB" sz="1000" i="1"/>
+          </a:p>
+        </p:txBody>
+      </p:sp>
+      <p:sp>
+        <p:nvSpPr>
+          <p:cNvPr id="2" name="Subtitle 2">
+            <a:extLst>
+              <a:ext uri="{FF2B5EF4-FFF2-40B4-BE49-F238E27FC236}">
+                <a16:creationId xmlns:a16="http://schemas.microsoft.com/office/drawing/2014/main" id="{F8B4EBA5-D065-6628-05A5-91C8183330F5}"/>
+              </a:ext>
+            </a:extLst>
+          </p:cNvPr>
+          <p:cNvSpPr txBox="1">
+            <a:spLocks/>
+          </p:cNvSpPr>
+          <p:nvPr/>
+        </p:nvSpPr>
+        <p:spPr>
+          <a:xfrm>
+            <a:off x="0" y="820738"/>
+            <a:ext cx="12192000" cy="1579919"/>
+          </a:xfrm>
+          <a:prstGeom prst="rect">
+            <a:avLst/>
+          </a:prstGeom>
+        </p:spPr>
+        <p:txBody>
+          <a:bodyPr vert="horz" lIns="91440" tIns="45720" rIns="91440" bIns="45720" rtlCol="0">
+            <a:normAutofit/>
+          </a:bodyPr>
+          <a:lstStyle>
+            <a:lvl1pPr marL="0" indent="0" algn="ctr" defTabSz="914400" rtl="0" eaLnBrk="1" latinLnBrk="0" hangingPunct="1">
+              <a:lnSpc>
+                <a:spcPct val="90000"/>
+              </a:lnSpc>
+              <a:spcBef>
+                <a:spcPts val="1000"/>
+              </a:spcBef>
+              <a:buFont typeface="Arial" panose="020B0604020202020204" pitchFamily="34" charset="0"/>
+              <a:buNone/>
+              <a:defRPr sz="2400" kern="1200">
+                <a:solidFill>
+                  <a:schemeClr val="tx1"/>
+                </a:solidFill>
+                <a:latin typeface="+mn-lt"/>
+                <a:ea typeface="+mn-ea"/>
+                <a:cs typeface="+mn-cs"/>
+              </a:defRPr>
+            </a:lvl1pPr>
+            <a:lvl2pPr marL="457200" indent="0" algn="ctr" defTabSz="914400" rtl="0" eaLnBrk="1" latinLnBrk="0" hangingPunct="1">
+              <a:lnSpc>
+                <a:spcPct val="90000"/>
+              </a:lnSpc>
+              <a:spcBef>
+                <a:spcPts val="500"/>
+              </a:spcBef>
+              <a:buFont typeface="Arial" panose="020B0604020202020204" pitchFamily="34" charset="0"/>
+              <a:buNone/>
+              <a:defRPr sz="2000" kern="1200">
+                <a:solidFill>
+                  <a:schemeClr val="tx1"/>
+                </a:solidFill>
+                <a:latin typeface="+mn-lt"/>
+                <a:ea typeface="+mn-ea"/>
+                <a:cs typeface="+mn-cs"/>
+              </a:defRPr>
+            </a:lvl2pPr>
+            <a:lvl3pPr marL="914400" indent="0" algn="ctr" defTabSz="914400" rtl="0" eaLnBrk="1" latinLnBrk="0" hangingPunct="1">
+              <a:lnSpc>
+                <a:spcPct val="90000"/>
+              </a:lnSpc>
+              <a:spcBef>
+                <a:spcPts val="500"/>
+              </a:spcBef>
+              <a:buFont typeface="Arial" panose="020B0604020202020204" pitchFamily="34" charset="0"/>
+              <a:buNone/>
+              <a:defRPr sz="1800" kern="1200">
+                <a:solidFill>
+                  <a:schemeClr val="tx1"/>
+                </a:solidFill>
+                <a:latin typeface="+mn-lt"/>
+                <a:ea typeface="+mn-ea"/>
+                <a:cs typeface="+mn-cs"/>
+              </a:defRPr>
+            </a:lvl3pPr>
+            <a:lvl4pPr marL="1371600" indent="0" algn="ctr" defTabSz="914400" rtl="0" eaLnBrk="1" latinLnBrk="0" hangingPunct="1">
+              <a:lnSpc>
+                <a:spcPct val="90000"/>
+              </a:lnSpc>
+              <a:spcBef>
+                <a:spcPts val="500"/>
+              </a:spcBef>
+              <a:buFont typeface="Arial" panose="020B0604020202020204" pitchFamily="34" charset="0"/>
+              <a:buNone/>
+              <a:defRPr sz="1600" kern="1200">
+                <a:solidFill>
+                  <a:schemeClr val="tx1"/>
+                </a:solidFill>
+                <a:latin typeface="+mn-lt"/>
+                <a:ea typeface="+mn-ea"/>
+                <a:cs typeface="+mn-cs"/>
+              </a:defRPr>
+            </a:lvl4pPr>
+            <a:lvl5pPr marL="1828800" indent="0" algn="ctr" defTabSz="914400" rtl="0" eaLnBrk="1" latinLnBrk="0" hangingPunct="1">
+              <a:lnSpc>
+                <a:spcPct val="90000"/>
+              </a:lnSpc>
+              <a:spcBef>
+                <a:spcPts val="500"/>
+              </a:spcBef>
+              <a:buFont typeface="Arial" panose="020B0604020202020204" pitchFamily="34" charset="0"/>
+              <a:buNone/>
+              <a:defRPr sz="1600" kern="1200">
+                <a:solidFill>
+                  <a:schemeClr val="tx1"/>
+                </a:solidFill>
+                <a:latin typeface="+mn-lt"/>
+                <a:ea typeface="+mn-ea"/>
+                <a:cs typeface="+mn-cs"/>
+              </a:defRPr>
+            </a:lvl5pPr>
+            <a:lvl6pPr marL="2286000" indent="0" algn="ctr" defTabSz="914400" rtl="0" eaLnBrk="1" latinLnBrk="0" hangingPunct="1">
+              <a:lnSpc>
+                <a:spcPct val="90000"/>
+              </a:lnSpc>
+              <a:spcBef>
+                <a:spcPts val="500"/>
+              </a:spcBef>
+              <a:buFont typeface="Arial" panose="020B0604020202020204" pitchFamily="34" charset="0"/>
+              <a:buNone/>
+              <a:defRPr sz="1600" kern="1200">
+                <a:solidFill>
+                  <a:schemeClr val="tx1"/>
+                </a:solidFill>
+                <a:latin typeface="+mn-lt"/>
+                <a:ea typeface="+mn-ea"/>
+                <a:cs typeface="+mn-cs"/>
+              </a:defRPr>
+            </a:lvl6pPr>
+            <a:lvl7pPr marL="2743200" indent="0" algn="ctr" defTabSz="914400" rtl="0" eaLnBrk="1" latinLnBrk="0" hangingPunct="1">
+              <a:lnSpc>
+                <a:spcPct val="90000"/>
+              </a:lnSpc>
+              <a:spcBef>
+                <a:spcPts val="500"/>
+              </a:spcBef>
+              <a:buFont typeface="Arial" panose="020B0604020202020204" pitchFamily="34" charset="0"/>
+              <a:buNone/>
+              <a:defRPr sz="1600" kern="1200">
+                <a:solidFill>
+                  <a:schemeClr val="tx1"/>
+                </a:solidFill>
+                <a:latin typeface="+mn-lt"/>
+                <a:ea typeface="+mn-ea"/>
+                <a:cs typeface="+mn-cs"/>
+              </a:defRPr>
+            </a:lvl7pPr>
+            <a:lvl8pPr marL="3200400" indent="0" algn="ctr" defTabSz="914400" rtl="0" eaLnBrk="1" latinLnBrk="0" hangingPunct="1">
+              <a:lnSpc>
+                <a:spcPct val="90000"/>
+              </a:lnSpc>
+              <a:spcBef>
+                <a:spcPts val="500"/>
+              </a:spcBef>
+              <a:buFont typeface="Arial" panose="020B0604020202020204" pitchFamily="34" charset="0"/>
+              <a:buNone/>
+              <a:defRPr sz="1600" kern="1200">
+                <a:solidFill>
+                  <a:schemeClr val="tx1"/>
+                </a:solidFill>
+                <a:latin typeface="+mn-lt"/>
+                <a:ea typeface="+mn-ea"/>
+                <a:cs typeface="+mn-cs"/>
+              </a:defRPr>
+            </a:lvl8pPr>
+            <a:lvl9pPr marL="3657600" indent="0" algn="ctr" defTabSz="914400" rtl="0" eaLnBrk="1" latinLnBrk="0" hangingPunct="1">
+              <a:lnSpc>
+                <a:spcPct val="90000"/>
+              </a:lnSpc>
+              <a:spcBef>
+                <a:spcPts val="500"/>
+              </a:spcBef>
+              <a:buFont typeface="Arial" panose="020B0604020202020204" pitchFamily="34" charset="0"/>
+              <a:buNone/>
+              <a:defRPr sz="1600" kern="1200">
+                <a:solidFill>
+                  <a:schemeClr val="tx1"/>
+                </a:solidFill>
+                <a:latin typeface="+mn-lt"/>
+                <a:ea typeface="+mn-ea"/>
+                <a:cs typeface="+mn-cs"/>
+              </a:defRPr>
+            </a:lvl9pPr>
+          </a:lstStyle>
+          <a:p>
+            <a:pPr marL="285750" indent="-285750" algn="l">
+              <a:buFontTx/>
+              <a:buChar char="-"/>
+            </a:pPr>
+            <a:r>
+              <a:rPr lang="en-GB" sz="1800" b="1" i="1">
+                <a:solidFill>
+                  <a:srgbClr val="FF0000"/>
+                </a:solidFill>
+              </a:rPr>
+              <a:t>Class</a:t>
+            </a:r>
+            <a:r>
+              <a:rPr lang="en-GB" sz="1800"/>
+              <a:t>: Class is a building block to describe details of an object</a:t>
+            </a:r>
+          </a:p>
+          <a:p>
+            <a:pPr marL="400050" indent="-400050" algn="l">
+              <a:buAutoNum type="romanUcParenR"/>
+            </a:pPr>
+            <a:r>
+              <a:rPr lang="en-GB" sz="1800"/>
+              <a:t>Describing Object</a:t>
+            </a:r>
+          </a:p>
+          <a:p>
+            <a:pPr algn="l"/>
+            <a:r>
+              <a:rPr lang="en-GB" sz="800" b="1" i="1"/>
+              <a:t>(Illustrating the code and use the Food – Shop example)</a:t>
+            </a:r>
+          </a:p>
+          <a:p>
+            <a:pPr algn="l"/>
+            <a:r>
+              <a:rPr lang="en-GB" sz="1800"/>
+              <a:t>II) Describing Behaviour</a:t>
+            </a:r>
+          </a:p>
+          <a:p>
+            <a:pPr algn="l"/>
+            <a:endParaRPr lang="en-GB" sz="1800"/>
+          </a:p>
+          <a:p>
+            <a:pPr algn="l"/>
+            <a:endParaRPr lang="en-GB" sz="1800"/>
+          </a:p>
+          <a:p>
+            <a:pPr algn="l"/>
+            <a:endParaRPr lang="en-GB" sz="800" b="1" i="1"/>
+          </a:p>
+        </p:txBody>
+      </p:sp>
+      <p:pic>
+        <p:nvPicPr>
+          <p:cNvPr id="1026" name="Picture 2" descr="KAPAS Commercial Oscillating Pedestal Fan, Heavy India | Ubuy">
+            <a:extLst>
+              <a:ext uri="{FF2B5EF4-FFF2-40B4-BE49-F238E27FC236}">
+                <a16:creationId xmlns:a16="http://schemas.microsoft.com/office/drawing/2014/main" id="{D65235E0-D979-3771-85A2-93745939C1A2}"/>
+              </a:ext>
+            </a:extLst>
+          </p:cNvPr>
+          <p:cNvPicPr>
+            <a:picLocks noChangeAspect="1" noChangeArrowheads="1"/>
+          </p:cNvPicPr>
+          <p:nvPr/>
+        </p:nvPicPr>
+        <p:blipFill>
+          <a:blip r:embed="rId2">
+            <a:extLst>
+              <a:ext uri="{28A0092B-C50C-407E-A947-70E740481C1C}">
+                <a14:useLocalDpi xmlns:a14="http://schemas.microsoft.com/office/drawing/2010/main" val="0"/>
+              </a:ext>
+            </a:extLst>
+          </a:blip>
+          <a:srcRect/>
+          <a:stretch>
+            <a:fillRect/>
+          </a:stretch>
+        </p:blipFill>
+        <p:spPr bwMode="auto">
+          <a:xfrm>
+            <a:off x="490168" y="2516549"/>
+            <a:ext cx="1760473" cy="3665176"/>
+          </a:xfrm>
+          <a:prstGeom prst="rect">
+            <a:avLst/>
+          </a:prstGeom>
+          <a:noFill/>
+          <a:extLst>
+            <a:ext uri="{909E8E84-426E-40DD-AFC4-6F175D3DCCD1}">
+              <a14:hiddenFill xmlns:a14="http://schemas.microsoft.com/office/drawing/2010/main">
+                <a:solidFill>
+                  <a:srgbClr val="FFFFFF"/>
+                </a:solidFill>
+              </a14:hiddenFill>
+            </a:ext>
+          </a:extLst>
+        </p:spPr>
+      </p:pic>
+      <p:sp>
+        <p:nvSpPr>
+          <p:cNvPr id="6" name="Subtitle 2">
+            <a:extLst>
+              <a:ext uri="{FF2B5EF4-FFF2-40B4-BE49-F238E27FC236}">
+                <a16:creationId xmlns:a16="http://schemas.microsoft.com/office/drawing/2014/main" id="{B6186AA4-73D5-4BB7-63DD-3879981B8F89}"/>
+              </a:ext>
+            </a:extLst>
+          </p:cNvPr>
+          <p:cNvSpPr txBox="1">
+            <a:spLocks/>
+          </p:cNvSpPr>
+          <p:nvPr/>
+        </p:nvSpPr>
+        <p:spPr>
+          <a:xfrm>
+            <a:off x="3390900" y="2065517"/>
+            <a:ext cx="8801100" cy="4792483"/>
+          </a:xfrm>
+          <a:prstGeom prst="rect">
+            <a:avLst/>
+          </a:prstGeom>
+        </p:spPr>
+        <p:txBody>
+          <a:bodyPr vert="horz" lIns="91440" tIns="45720" rIns="91440" bIns="45720" rtlCol="0">
+            <a:normAutofit/>
+          </a:bodyPr>
+          <a:lstStyle>
+            <a:lvl1pPr marL="0" indent="0" algn="ctr" defTabSz="914400" rtl="0" eaLnBrk="1" latinLnBrk="0" hangingPunct="1">
+              <a:lnSpc>
+                <a:spcPct val="90000"/>
+              </a:lnSpc>
+              <a:spcBef>
+                <a:spcPts val="1000"/>
+              </a:spcBef>
+              <a:buFont typeface="Arial" panose="020B0604020202020204" pitchFamily="34" charset="0"/>
+              <a:buNone/>
+              <a:defRPr sz="2400" kern="1200">
+                <a:solidFill>
+                  <a:schemeClr val="tx1"/>
+                </a:solidFill>
+                <a:latin typeface="+mn-lt"/>
+                <a:ea typeface="+mn-ea"/>
+                <a:cs typeface="+mn-cs"/>
+              </a:defRPr>
+            </a:lvl1pPr>
+            <a:lvl2pPr marL="457200" indent="0" algn="ctr" defTabSz="914400" rtl="0" eaLnBrk="1" latinLnBrk="0" hangingPunct="1">
+              <a:lnSpc>
+                <a:spcPct val="90000"/>
+              </a:lnSpc>
+              <a:spcBef>
+                <a:spcPts val="500"/>
+              </a:spcBef>
+              <a:buFont typeface="Arial" panose="020B0604020202020204" pitchFamily="34" charset="0"/>
+              <a:buNone/>
+              <a:defRPr sz="2000" kern="1200">
+                <a:solidFill>
+                  <a:schemeClr val="tx1"/>
+                </a:solidFill>
+                <a:latin typeface="+mn-lt"/>
+                <a:ea typeface="+mn-ea"/>
+                <a:cs typeface="+mn-cs"/>
+              </a:defRPr>
+            </a:lvl2pPr>
+            <a:lvl3pPr marL="914400" indent="0" algn="ctr" defTabSz="914400" rtl="0" eaLnBrk="1" latinLnBrk="0" hangingPunct="1">
+              <a:lnSpc>
+                <a:spcPct val="90000"/>
+              </a:lnSpc>
+              <a:spcBef>
+                <a:spcPts val="500"/>
+              </a:spcBef>
+              <a:buFont typeface="Arial" panose="020B0604020202020204" pitchFamily="34" charset="0"/>
+              <a:buNone/>
+              <a:defRPr sz="1800" kern="1200">
+                <a:solidFill>
+                  <a:schemeClr val="tx1"/>
+                </a:solidFill>
+                <a:latin typeface="+mn-lt"/>
+                <a:ea typeface="+mn-ea"/>
+                <a:cs typeface="+mn-cs"/>
+              </a:defRPr>
+            </a:lvl3pPr>
+            <a:lvl4pPr marL="1371600" indent="0" algn="ctr" defTabSz="914400" rtl="0" eaLnBrk="1" latinLnBrk="0" hangingPunct="1">
+              <a:lnSpc>
+                <a:spcPct val="90000"/>
+              </a:lnSpc>
+              <a:spcBef>
+                <a:spcPts val="500"/>
+              </a:spcBef>
+              <a:buFont typeface="Arial" panose="020B0604020202020204" pitchFamily="34" charset="0"/>
+              <a:buNone/>
+              <a:defRPr sz="1600" kern="1200">
+                <a:solidFill>
+                  <a:schemeClr val="tx1"/>
+                </a:solidFill>
+                <a:latin typeface="+mn-lt"/>
+                <a:ea typeface="+mn-ea"/>
+                <a:cs typeface="+mn-cs"/>
+              </a:defRPr>
+            </a:lvl4pPr>
+            <a:lvl5pPr marL="1828800" indent="0" algn="ctr" defTabSz="914400" rtl="0" eaLnBrk="1" latinLnBrk="0" hangingPunct="1">
+              <a:lnSpc>
+                <a:spcPct val="90000"/>
+              </a:lnSpc>
+              <a:spcBef>
+                <a:spcPts val="500"/>
+              </a:spcBef>
+              <a:buFont typeface="Arial" panose="020B0604020202020204" pitchFamily="34" charset="0"/>
+              <a:buNone/>
+              <a:defRPr sz="1600" kern="1200">
+                <a:solidFill>
+                  <a:schemeClr val="tx1"/>
+                </a:solidFill>
+                <a:latin typeface="+mn-lt"/>
+                <a:ea typeface="+mn-ea"/>
+                <a:cs typeface="+mn-cs"/>
+              </a:defRPr>
+            </a:lvl5pPr>
+            <a:lvl6pPr marL="2286000" indent="0" algn="ctr" defTabSz="914400" rtl="0" eaLnBrk="1" latinLnBrk="0" hangingPunct="1">
+              <a:lnSpc>
+                <a:spcPct val="90000"/>
+              </a:lnSpc>
+              <a:spcBef>
+                <a:spcPts val="500"/>
+              </a:spcBef>
+              <a:buFont typeface="Arial" panose="020B0604020202020204" pitchFamily="34" charset="0"/>
+              <a:buNone/>
+              <a:defRPr sz="1600" kern="1200">
+                <a:solidFill>
+                  <a:schemeClr val="tx1"/>
+                </a:solidFill>
+                <a:latin typeface="+mn-lt"/>
+                <a:ea typeface="+mn-ea"/>
+                <a:cs typeface="+mn-cs"/>
+              </a:defRPr>
+            </a:lvl6pPr>
+            <a:lvl7pPr marL="2743200" indent="0" algn="ctr" defTabSz="914400" rtl="0" eaLnBrk="1" latinLnBrk="0" hangingPunct="1">
+              <a:lnSpc>
+                <a:spcPct val="90000"/>
+              </a:lnSpc>
+              <a:spcBef>
+                <a:spcPts val="500"/>
+              </a:spcBef>
+              <a:buFont typeface="Arial" panose="020B0604020202020204" pitchFamily="34" charset="0"/>
+              <a:buNone/>
+              <a:defRPr sz="1600" kern="1200">
+                <a:solidFill>
+                  <a:schemeClr val="tx1"/>
+                </a:solidFill>
+                <a:latin typeface="+mn-lt"/>
+                <a:ea typeface="+mn-ea"/>
+                <a:cs typeface="+mn-cs"/>
+              </a:defRPr>
+            </a:lvl7pPr>
+            <a:lvl8pPr marL="3200400" indent="0" algn="ctr" defTabSz="914400" rtl="0" eaLnBrk="1" latinLnBrk="0" hangingPunct="1">
+              <a:lnSpc>
+                <a:spcPct val="90000"/>
+              </a:lnSpc>
+              <a:spcBef>
+                <a:spcPts val="500"/>
+              </a:spcBef>
+              <a:buFont typeface="Arial" panose="020B0604020202020204" pitchFamily="34" charset="0"/>
+              <a:buNone/>
+              <a:defRPr sz="1600" kern="1200">
+                <a:solidFill>
+                  <a:schemeClr val="tx1"/>
+                </a:solidFill>
+                <a:latin typeface="+mn-lt"/>
+                <a:ea typeface="+mn-ea"/>
+                <a:cs typeface="+mn-cs"/>
+              </a:defRPr>
+            </a:lvl8pPr>
+            <a:lvl9pPr marL="3657600" indent="0" algn="ctr" defTabSz="914400" rtl="0" eaLnBrk="1" latinLnBrk="0" hangingPunct="1">
+              <a:lnSpc>
+                <a:spcPct val="90000"/>
+              </a:lnSpc>
+              <a:spcBef>
+                <a:spcPts val="500"/>
+              </a:spcBef>
+              <a:buFont typeface="Arial" panose="020B0604020202020204" pitchFamily="34" charset="0"/>
+              <a:buNone/>
+              <a:defRPr sz="1600" kern="1200">
+                <a:solidFill>
+                  <a:schemeClr val="tx1"/>
+                </a:solidFill>
+                <a:latin typeface="+mn-lt"/>
+                <a:ea typeface="+mn-ea"/>
+                <a:cs typeface="+mn-cs"/>
+              </a:defRPr>
+            </a:lvl9pPr>
+          </a:lstStyle>
+          <a:p>
+            <a:pPr marL="285750" indent="-285750" algn="l">
+              <a:buFontTx/>
+              <a:buChar char="-"/>
+            </a:pPr>
+            <a:r>
+              <a:rPr lang="en-GB" sz="1800"/>
+              <a:t>Let’s take a fan for example, fan can be turned on – off using “switch”, we just need to simply push the switch on or off and what happen after the push depends on the device.</a:t>
+            </a:r>
+          </a:p>
+          <a:p>
+            <a:pPr marL="285750" indent="-285750" algn="l">
+              <a:buFont typeface="Symbol" panose="05050102010706020507" pitchFamily="18" charset="2"/>
+              <a:buChar char="Þ"/>
+            </a:pPr>
+            <a:r>
+              <a:rPr lang="en-GB" sz="1800"/>
+              <a:t>What we have just identified is the “Behavioral aspect of things”. When we say something is switched on or off =&gt; we have described its behavior (a fan, a light bulb, a car are also the same)</a:t>
+            </a:r>
+          </a:p>
+          <a:p>
+            <a:pPr marL="285750" indent="-285750" algn="l">
+              <a:buFont typeface="Symbol" panose="05050102010706020507" pitchFamily="18" charset="2"/>
+              <a:buChar char="Þ"/>
+            </a:pPr>
+            <a:r>
+              <a:rPr lang="en-GB" sz="1800"/>
+              <a:t>Once we have identified all of that behaviours  </a:t>
+            </a:r>
+          </a:p>
+          <a:p>
+            <a:pPr algn="l"/>
+            <a:endParaRPr lang="en-GB" sz="1800"/>
+          </a:p>
+          <a:p>
+            <a:pPr algn="l"/>
+            <a:endParaRPr lang="en-GB" sz="800" b="1" i="1"/>
+          </a:p>
+        </p:txBody>
+      </p:sp>
+    </p:spTree>
+    <p:extLst>
+      <p:ext uri="{BB962C8B-B14F-4D97-AF65-F5344CB8AC3E}">
+        <p14:creationId xmlns:p14="http://schemas.microsoft.com/office/powerpoint/2010/main" val="2265539881"/>
+      </p:ext>
+    </p:extLst>
+  </p:cSld>
+  <p:clrMapOvr>
+    <a:masterClrMapping/>
+  </p:clrMapOvr>
+  <p:timing>
+    <p:tnLst>
+      <p:par>
+        <p:cTn id="1" dur="indefinite" restart="never" nodeType="tmRoot">
+          <p:childTnLst>
+            <p:seq concurrent="1" nextAc="seek">
+              <p:cTn id="2" dur="indefinite" nodeType="mainSeq">
+                <p:childTnLst>
+                  <p:par>
+                    <p:cTn id="3" fill="hold">
+                      <p:stCondLst>
+                        <p:cond delay="indefinite"/>
+                      </p:stCondLst>
+                      <p:childTnLst>
+                        <p:par>
+                          <p:cTn id="4" fill="hold">
+                            <p:stCondLst>
+                              <p:cond delay="0"/>
+                            </p:stCondLst>
+                            <p:childTnLst>
+                              <p:par>
+                                <p:cTn id="5" presetID="1" presetClass="entr" presetSubtype="0" fill="hold" nodeType="clickEffect">
+                                  <p:stCondLst>
+                                    <p:cond delay="0"/>
+                                  </p:stCondLst>
+                                  <p:childTnLst>
+                                    <p:set>
+                                      <p:cBhvr>
+                                        <p:cTn id="6" dur="1" fill="hold">
+                                          <p:stCondLst>
+                                            <p:cond delay="0"/>
+                                          </p:stCondLst>
+                                        </p:cTn>
+                                        <p:tgtEl>
+                                          <p:spTgt spid="2">
+                                            <p:txEl>
+                                              <p:pRg st="0" end="0"/>
+                                            </p:txEl>
+                                          </p:spTgt>
+                                        </p:tgtEl>
+                                        <p:attrNameLst>
+                                          <p:attrName>style.visibility</p:attrName>
+                                        </p:attrNameLst>
+                                      </p:cBhvr>
+                                      <p:to>
+                                        <p:strVal val="visible"/>
+                                      </p:to>
+                                    </p:set>
+                                  </p:childTnLst>
+                                </p:cTn>
+                              </p:par>
+                            </p:childTnLst>
+                          </p:cTn>
+                        </p:par>
+                      </p:childTnLst>
+                    </p:cTn>
+                  </p:par>
+                  <p:par>
+                    <p:cTn id="7" fill="hold">
+                      <p:stCondLst>
+                        <p:cond delay="indefinite"/>
+                      </p:stCondLst>
+                      <p:childTnLst>
+                        <p:par>
+                          <p:cTn id="8" fill="hold">
+                            <p:stCondLst>
+                              <p:cond delay="0"/>
+                            </p:stCondLst>
+                            <p:childTnLst>
+                              <p:par>
+                                <p:cTn id="9" presetID="1" presetClass="entr" presetSubtype="0" fill="hold" nodeType="clickEffect">
+                                  <p:stCondLst>
+                                    <p:cond delay="0"/>
+                                  </p:stCondLst>
+                                  <p:childTnLst>
+                                    <p:set>
+                                      <p:cBhvr>
+                                        <p:cTn id="10" dur="1" fill="hold">
+                                          <p:stCondLst>
+                                            <p:cond delay="0"/>
+                                          </p:stCondLst>
+                                        </p:cTn>
+                                        <p:tgtEl>
+                                          <p:spTgt spid="2">
+                                            <p:txEl>
+                                              <p:pRg st="1" end="1"/>
+                                            </p:txEl>
+                                          </p:spTgt>
+                                        </p:tgtEl>
+                                        <p:attrNameLst>
+                                          <p:attrName>style.visibility</p:attrName>
+                                        </p:attrNameLst>
+                                      </p:cBhvr>
+                                      <p:to>
+                                        <p:strVal val="visible"/>
+                                      </p:to>
+                                    </p:set>
+                                  </p:childTnLst>
+                                </p:cTn>
+                              </p:par>
+                            </p:childTnLst>
+                          </p:cTn>
+                        </p:par>
+                      </p:childTnLst>
+                    </p:cTn>
+                  </p:par>
+                  <p:par>
+                    <p:cTn id="11" fill="hold">
+                      <p:stCondLst>
+                        <p:cond delay="indefinite"/>
+                      </p:stCondLst>
+                      <p:childTnLst>
+                        <p:par>
+                          <p:cTn id="12" fill="hold">
+                            <p:stCondLst>
+                              <p:cond delay="0"/>
+                            </p:stCondLst>
+                            <p:childTnLst>
+                              <p:par>
+                                <p:cTn id="13" presetID="1" presetClass="entr" presetSubtype="0" fill="hold" nodeType="clickEffect">
+                                  <p:stCondLst>
+                                    <p:cond delay="0"/>
+                                  </p:stCondLst>
+                                  <p:childTnLst>
+                                    <p:set>
+                                      <p:cBhvr>
+                                        <p:cTn id="14" dur="1" fill="hold">
+                                          <p:stCondLst>
+                                            <p:cond delay="0"/>
+                                          </p:stCondLst>
+                                        </p:cTn>
+                                        <p:tgtEl>
+                                          <p:spTgt spid="2">
+                                            <p:txEl>
+                                              <p:pRg st="2" end="2"/>
+                                            </p:txEl>
+                                          </p:spTgt>
+                                        </p:tgtEl>
+                                        <p:attrNameLst>
+                                          <p:attrName>style.visibility</p:attrName>
+                                        </p:attrNameLst>
+                                      </p:cBhvr>
+                                      <p:to>
+                                        <p:strVal val="visible"/>
+                                      </p:to>
+                                    </p:set>
+                                  </p:childTnLst>
+                                </p:cTn>
+                              </p:par>
+                            </p:childTnLst>
+                          </p:cTn>
+                        </p:par>
+                      </p:childTnLst>
+                    </p:cTn>
+                  </p:par>
+                  <p:par>
+                    <p:cTn id="15" fill="hold">
+                      <p:stCondLst>
+                        <p:cond delay="indefinite"/>
+                      </p:stCondLst>
+                      <p:childTnLst>
+                        <p:par>
+                          <p:cTn id="16" fill="hold">
+                            <p:stCondLst>
+                              <p:cond delay="0"/>
+                            </p:stCondLst>
+                            <p:childTnLst>
+                              <p:par>
+                                <p:cTn id="17" presetID="1" presetClass="entr" presetSubtype="0" fill="hold" nodeType="clickEffect">
+                                  <p:stCondLst>
+                                    <p:cond delay="0"/>
+                                  </p:stCondLst>
+                                  <p:childTnLst>
+                                    <p:set>
+                                      <p:cBhvr>
+                                        <p:cTn id="18" dur="1" fill="hold">
+                                          <p:stCondLst>
+                                            <p:cond delay="0"/>
+                                          </p:stCondLst>
+                                        </p:cTn>
+                                        <p:tgtEl>
+                                          <p:spTgt spid="2">
+                                            <p:txEl>
+                                              <p:pRg st="3" end="3"/>
+                                            </p:txEl>
+                                          </p:spTgt>
+                                        </p:tgtEl>
+                                        <p:attrNameLst>
+                                          <p:attrName>style.visibility</p:attrName>
+                                        </p:attrNameLst>
+                                      </p:cBhvr>
+                                      <p:to>
+                                        <p:strVal val="visible"/>
+                                      </p:to>
+                                    </p:set>
+                                  </p:childTnLst>
+                                </p:cTn>
+                              </p:par>
+                            </p:childTnLst>
+                          </p:cTn>
+                        </p:par>
+                      </p:childTnLst>
+                    </p:cTn>
+                  </p:par>
+                </p:childTnLst>
+              </p:cTn>
+              <p:prevCondLst>
+                <p:cond evt="onPrev" delay="0">
+                  <p:tgtEl>
+                    <p:sldTgt/>
+                  </p:tgtEl>
+                </p:cond>
+              </p:prevCondLst>
+              <p:nextCondLst>
+                <p:cond evt="onNext" delay="0">
+                  <p:tgtEl>
+                    <p:sldTgt/>
+                  </p:tgtEl>
+                </p:cond>
+              </p:nextCondLst>
+            </p:seq>
+          </p:childTnLst>
+        </p:cTn>
+      </p:par>
+    </p:tnLst>
+  </p:timing>
 </p:sld>
 </file>
 

</xml_diff>